<commit_message>
Updated all Robot Design lessons
</commit_message>
<xml_diff>
--- a/translations/en-us/RobotGame/AlignInLaunch.pptx
+++ b/translations/en-us/RobotGame/AlignInLaunch.pptx
@@ -19,7 +19,7 @@
   <p:sldIdLst>
     <p:sldId id="289" r:id="rId8"/>
     <p:sldId id="290" r:id="rId9"/>
-    <p:sldId id="291" r:id="rId10"/>
+    <p:sldId id="293" r:id="rId10"/>
     <p:sldId id="292" r:id="rId11"/>
     <p:sldId id="274" r:id="rId12"/>
   </p:sldIdLst>
@@ -221,7 +221,7 @@
           <a:p>
             <a:fld id="{E354B44E-40A3-0E46-B16A-9BF1250A248B}" type="datetimeFigureOut">
               <a:rPr lang="en-US" smtClean="0"/>
-              <a:t>10/27/22</a:t>
+              <a:t>5/29/23</a:t>
             </a:fld>
             <a:endParaRPr lang="en-US"/>
           </a:p>
@@ -387,7 +387,7 @@
           <a:p>
             <a:fld id="{C86AD16C-2DB4-6642-BAD4-9ED973A087A0}" type="datetimeFigureOut">
               <a:rPr lang="en-US" smtClean="0"/>
-              <a:t>10/27/22</a:t>
+              <a:t>5/29/23</a:t>
             </a:fld>
             <a:endParaRPr lang="en-US"/>
           </a:p>
@@ -1014,9 +1014,9 @@
           <a:bodyPr/>
           <a:lstStyle/>
           <a:p>
-            <a:fld id="{5BC1C17E-05DC-7F4A-B7CA-9A1F3462FCEC}" type="datetime1">
+            <a:fld id="{9A8CE915-3EB5-D446-B69D-8B2DA7ECE9C6}" type="datetime1">
               <a:rPr lang="en-US" smtClean="0"/>
-              <a:t>10/27/22</a:t>
+              <a:t>5/29/23</a:t>
             </a:fld>
             <a:endParaRPr lang="en-US"/>
           </a:p>
@@ -1039,7 +1039,7 @@
           <a:p>
             <a:r>
               <a:rPr lang="en-US"/>
-              <a:t>© 2022, FLL Tutorials</a:t>
+              <a:t>© 2023, FLLTutorials.com. Last Update 5/29/2023</a:t>
             </a:r>
           </a:p>
         </p:txBody>
@@ -1610,9 +1610,9 @@
           <a:bodyPr/>
           <a:lstStyle/>
           <a:p>
-            <a:fld id="{2345478D-ED3A-2D43-B602-ADF9F516D57D}" type="datetime1">
+            <a:fld id="{67EA17BC-08FB-184A-A3DD-BAB930A3B53B}" type="datetime1">
               <a:rPr lang="en-US" smtClean="0"/>
-              <a:t>10/27/22</a:t>
+              <a:t>5/29/23</a:t>
             </a:fld>
             <a:endParaRPr lang="en-US"/>
           </a:p>
@@ -1635,7 +1635,7 @@
           <a:p>
             <a:r>
               <a:rPr lang="en-US"/>
-              <a:t>© 2022, FLL Tutorials</a:t>
+              <a:t>© 2023, FLLTutorials.com. Last Update 5/29/2023</a:t>
             </a:r>
           </a:p>
         </p:txBody>
@@ -1791,9 +1791,9 @@
           <a:bodyPr/>
           <a:lstStyle/>
           <a:p>
-            <a:fld id="{2B21F7C6-94FF-4C45-B827-BB99AF1EAD48}" type="datetime1">
+            <a:fld id="{CE463E8B-3D6B-4A49-9FDF-475DCAE02901}" type="datetime1">
               <a:rPr lang="en-US" smtClean="0"/>
-              <a:t>10/27/22</a:t>
+              <a:t>5/29/23</a:t>
             </a:fld>
             <a:endParaRPr lang="en-US"/>
           </a:p>
@@ -1816,7 +1816,7 @@
           <a:p>
             <a:r>
               <a:rPr lang="en-US"/>
-              <a:t>© 2022, FLL Tutorials</a:t>
+              <a:t>© 2023, FLLTutorials.com. Last Update 5/29/2023</a:t>
             </a:r>
           </a:p>
         </p:txBody>
@@ -2007,9 +2007,9 @@
           <a:bodyPr/>
           <a:lstStyle/>
           <a:p>
-            <a:fld id="{F095677E-93E3-E341-A6DD-EAEF296D2199}" type="datetime1">
+            <a:fld id="{60A5BA96-F4E9-6D45-A88B-BF51EFDE1038}" type="datetime1">
               <a:rPr lang="en-US" smtClean="0"/>
-              <a:t>10/27/22</a:t>
+              <a:t>5/29/23</a:t>
             </a:fld>
             <a:endParaRPr lang="en-US"/>
           </a:p>
@@ -2037,7 +2037,7 @@
           <a:p>
             <a:r>
               <a:rPr lang="en-US"/>
-              <a:t>© 2022, FLL Tutorials</a:t>
+              <a:t>© 2023, FLLTutorials.com. Last Update 5/29/2023</a:t>
             </a:r>
           </a:p>
         </p:txBody>
@@ -2227,7 +2227,7 @@
           <a:noFill/>
           <a:extLst>
             <a:ext uri="{909E8E84-426E-40dd-AFC4-6F175D3DCCD1}">
-              <a14:hiddenFill xmlns:a14="http://schemas.microsoft.com/office/drawing/2010/main" xmlns="">
+              <a14:hiddenFill xmlns="" xmlns:a14="http://schemas.microsoft.com/office/drawing/2010/main">
                 <a:solidFill>
                   <a:srgbClr val="FFFFFF"/>
                 </a:solidFill>
@@ -2851,9 +2851,9 @@
           <a:bodyPr/>
           <a:lstStyle/>
           <a:p>
-            <a:fld id="{AB8B6D9D-E6E0-EF42-9148-87960526260B}" type="datetime1">
+            <a:fld id="{C28A0E70-F6D1-8349-90B0-70C286A7F22B}" type="datetime1">
               <a:rPr lang="en-US" smtClean="0"/>
-              <a:t>10/27/22</a:t>
+              <a:t>5/29/23</a:t>
             </a:fld>
             <a:endParaRPr lang="en-US"/>
           </a:p>
@@ -2876,7 +2876,7 @@
           <a:p>
             <a:r>
               <a:rPr lang="en-US"/>
-              <a:t>© 2022, FLL Tutorials</a:t>
+              <a:t>© 2023, FLLTutorials.com. Last Update 5/29/2023</a:t>
             </a:r>
           </a:p>
         </p:txBody>
@@ -3116,9 +3116,9 @@
           <a:bodyPr/>
           <a:lstStyle/>
           <a:p>
-            <a:fld id="{5C95638D-1674-2245-AE53-321129BED17D}" type="datetime1">
+            <a:fld id="{500C0AB7-F258-1342-B6B9-6A210030395C}" type="datetime1">
               <a:rPr lang="en-US" smtClean="0"/>
-              <a:t>10/27/22</a:t>
+              <a:t>5/29/23</a:t>
             </a:fld>
             <a:endParaRPr lang="en-US"/>
           </a:p>
@@ -3172,7 +3172,7 @@
           <a:p>
             <a:r>
               <a:rPr lang="en-US"/>
-              <a:t>© 2022, FLL Tutorials</a:t>
+              <a:t>© 2023, FLLTutorials.com. Last Update 5/29/2023</a:t>
             </a:r>
           </a:p>
         </p:txBody>
@@ -3419,9 +3419,9 @@
           <a:bodyPr/>
           <a:lstStyle/>
           <a:p>
-            <a:fld id="{49B50A98-F006-704B-B85F-287F54B92EF4}" type="datetime1">
+            <a:fld id="{2F3E22F4-D5EF-5343-AB56-0A736A05CCD5}" type="datetime1">
               <a:rPr lang="en-US" smtClean="0"/>
-              <a:t>10/27/22</a:t>
+              <a:t>5/29/23</a:t>
             </a:fld>
             <a:endParaRPr lang="en-US"/>
           </a:p>
@@ -3444,7 +3444,7 @@
           <a:p>
             <a:r>
               <a:rPr lang="en-US"/>
-              <a:t>© 2022, FLL Tutorials</a:t>
+              <a:t>© 2023, FLLTutorials.com. Last Update 5/29/2023</a:t>
             </a:r>
           </a:p>
         </p:txBody>
@@ -3873,9 +3873,9 @@
           <a:bodyPr/>
           <a:lstStyle/>
           <a:p>
-            <a:fld id="{AF15C095-960D-0F45-A5AF-424F92D0B119}" type="datetime1">
+            <a:fld id="{5F25207A-9F0B-EB4A-8D8A-D95E776EE236}" type="datetime1">
               <a:rPr lang="en-US" smtClean="0"/>
-              <a:t>10/27/22</a:t>
+              <a:t>5/29/23</a:t>
             </a:fld>
             <a:endParaRPr lang="en-US"/>
           </a:p>
@@ -3898,7 +3898,7 @@
           <a:p>
             <a:r>
               <a:rPr lang="en-US"/>
-              <a:t>© 2022, FLL Tutorials</a:t>
+              <a:t>© 2023, FLLTutorials.com. Last Update 5/29/2023</a:t>
             </a:r>
           </a:p>
         </p:txBody>
@@ -4001,9 +4001,9 @@
           <a:bodyPr/>
           <a:lstStyle/>
           <a:p>
-            <a:fld id="{AEA2D7F4-100D-564F-8B59-E22914EB67F3}" type="datetime1">
+            <a:fld id="{F6500C32-ACB8-594C-8F88-46C32BC66C67}" type="datetime1">
               <a:rPr lang="en-US" smtClean="0"/>
-              <a:t>10/27/22</a:t>
+              <a:t>5/29/23</a:t>
             </a:fld>
             <a:endParaRPr lang="en-US"/>
           </a:p>
@@ -4026,7 +4026,7 @@
           <a:p>
             <a:r>
               <a:rPr lang="en-US"/>
-              <a:t>© 2022, FLL Tutorials</a:t>
+              <a:t>© 2023, FLLTutorials.com. Last Update 5/29/2023</a:t>
             </a:r>
           </a:p>
         </p:txBody>
@@ -4107,9 +4107,9 @@
           <a:bodyPr/>
           <a:lstStyle/>
           <a:p>
-            <a:fld id="{BD6FD552-40E2-BA49-8C89-0AED762CBCD0}" type="datetime1">
+            <a:fld id="{EFEEAED1-3A8E-1B49-8C4C-27941E6A2050}" type="datetime1">
               <a:rPr lang="en-US" smtClean="0"/>
-              <a:t>10/27/22</a:t>
+              <a:t>5/29/23</a:t>
             </a:fld>
             <a:endParaRPr lang="en-US"/>
           </a:p>
@@ -4132,7 +4132,7 @@
           <a:p>
             <a:r>
               <a:rPr lang="en-US"/>
-              <a:t>© 2022, FLL Tutorials</a:t>
+              <a:t>© 2023, FLLTutorials.com. Last Update 5/29/2023</a:t>
             </a:r>
           </a:p>
         </p:txBody>
@@ -4365,9 +4365,9 @@
           <a:bodyPr/>
           <a:lstStyle/>
           <a:p>
-            <a:fld id="{FDC9EA15-300E-B344-8E2E-766E390D6842}" type="datetime1">
+            <a:fld id="{E29952FF-F81A-C344-9DEE-2EE8783ED614}" type="datetime1">
               <a:rPr lang="en-US" smtClean="0"/>
-              <a:t>10/27/22</a:t>
+              <a:t>5/29/23</a:t>
             </a:fld>
             <a:endParaRPr lang="en-US"/>
           </a:p>
@@ -4390,7 +4390,7 @@
           <a:p>
             <a:r>
               <a:rPr lang="en-US"/>
-              <a:t>© 2022, FLL Tutorials</a:t>
+              <a:t>© 2023, FLLTutorials.com. Last Update 5/29/2023</a:t>
             </a:r>
           </a:p>
         </p:txBody>
@@ -4577,9 +4577,9 @@
           <a:bodyPr/>
           <a:lstStyle/>
           <a:p>
-            <a:fld id="{19991CEB-BE9D-C042-9AFD-810B2713BF19}" type="datetime1">
+            <a:fld id="{C11AFFEF-FA2F-3A41-AADB-86A6CE9FD8AD}" type="datetime1">
               <a:rPr lang="en-US" smtClean="0"/>
-              <a:t>10/27/22</a:t>
+              <a:t>5/29/23</a:t>
             </a:fld>
             <a:endParaRPr lang="en-US"/>
           </a:p>
@@ -4602,7 +4602,7 @@
           <a:p>
             <a:r>
               <a:rPr lang="en-US"/>
-              <a:t>© 2022, FLL Tutorials</a:t>
+              <a:t>© 2023, FLLTutorials.com. Last Update 5/29/2023</a:t>
             </a:r>
           </a:p>
         </p:txBody>
@@ -4860,9 +4860,9 @@
           <a:bodyPr/>
           <a:lstStyle/>
           <a:p>
-            <a:fld id="{BDA11284-7DC9-A34C-A131-D7C9DD3F00A7}" type="datetime1">
+            <a:fld id="{E3BC6568-423D-844C-90F9-6821C90F8FE1}" type="datetime1">
               <a:rPr lang="en-US" smtClean="0"/>
-              <a:t>10/27/22</a:t>
+              <a:t>5/29/23</a:t>
             </a:fld>
             <a:endParaRPr lang="en-US"/>
           </a:p>
@@ -4885,7 +4885,7 @@
           <a:p>
             <a:r>
               <a:rPr lang="en-US"/>
-              <a:t>© 2022, FLL Tutorials</a:t>
+              <a:t>© 2023, FLLTutorials.com. Last Update 5/29/2023</a:t>
             </a:r>
           </a:p>
         </p:txBody>
@@ -5127,9 +5127,9 @@
           <a:bodyPr/>
           <a:lstStyle/>
           <a:p>
-            <a:fld id="{C6B2B491-00E2-4445-BFAC-0930D608B434}" type="datetime1">
+            <a:fld id="{0FAA76A5-1797-F048-9296-A1717B758DBF}" type="datetime1">
               <a:rPr lang="en-US" smtClean="0"/>
-              <a:t>10/27/22</a:t>
+              <a:t>5/29/23</a:t>
             </a:fld>
             <a:endParaRPr lang="en-US"/>
           </a:p>
@@ -5152,7 +5152,7 @@
           <a:p>
             <a:r>
               <a:rPr lang="en-US"/>
-              <a:t>© 2022, FLL Tutorials</a:t>
+              <a:t>© 2023, FLLTutorials.com. Last Update 5/29/2023</a:t>
             </a:r>
           </a:p>
         </p:txBody>
@@ -5316,9 +5316,9 @@
           <a:bodyPr/>
           <a:lstStyle/>
           <a:p>
-            <a:fld id="{16DAA471-E4EC-3B47-A710-4C86723882E7}" type="datetime1">
+            <a:fld id="{42113AB6-6D9F-8E47-8FEA-BD195656E256}" type="datetime1">
               <a:rPr lang="en-US" smtClean="0"/>
-              <a:t>10/27/22</a:t>
+              <a:t>5/29/23</a:t>
             </a:fld>
             <a:endParaRPr lang="en-US"/>
           </a:p>
@@ -5341,7 +5341,7 @@
           <a:p>
             <a:r>
               <a:rPr lang="en-US"/>
-              <a:t>© 2022, FLL Tutorials</a:t>
+              <a:t>© 2023, FLLTutorials.com. Last Update 5/29/2023</a:t>
             </a:r>
           </a:p>
         </p:txBody>
@@ -5517,9 +5517,9 @@
           <a:bodyPr/>
           <a:lstStyle/>
           <a:p>
-            <a:fld id="{699F5CC3-B349-3E4A-B33C-2C08A4E5C0CA}" type="datetime1">
+            <a:fld id="{A316D353-5B05-3F40-A939-88956A08DA0F}" type="datetime1">
               <a:rPr lang="en-US" smtClean="0"/>
-              <a:t>10/27/22</a:t>
+              <a:t>5/29/23</a:t>
             </a:fld>
             <a:endParaRPr lang="en-US"/>
           </a:p>
@@ -5542,7 +5542,7 @@
           <a:p>
             <a:r>
               <a:rPr lang="en-US"/>
-              <a:t>© 2022, FLL Tutorials</a:t>
+              <a:t>© 2023, FLLTutorials.com. Last Update 5/29/2023</a:t>
             </a:r>
           </a:p>
         </p:txBody>
@@ -5688,9 +5688,9 @@
           <a:bodyPr/>
           <a:lstStyle/>
           <a:p>
-            <a:fld id="{D8A163CC-EE8A-134E-8655-A82929F26E9F}" type="datetime1">
+            <a:fld id="{AA685DEC-CA61-A340-9E4C-2FA55E8D60B5}" type="datetime1">
               <a:rPr lang="en-US" smtClean="0"/>
-              <a:t>10/27/22</a:t>
+              <a:t>5/29/23</a:t>
             </a:fld>
             <a:endParaRPr lang="en-US"/>
           </a:p>
@@ -5713,7 +5713,7 @@
           <a:p>
             <a:r>
               <a:rPr lang="en-US"/>
-              <a:t>© 2022, FLL Tutorials</a:t>
+              <a:t>© 2023, FLLTutorials.com. Last Update 5/29/2023</a:t>
             </a:r>
           </a:p>
         </p:txBody>
@@ -5936,9 +5936,9 @@
           <a:bodyPr/>
           <a:lstStyle/>
           <a:p>
-            <a:fld id="{5F268E1E-11F5-0641-B532-997B2224DE3D}" type="datetime1">
+            <a:fld id="{7115AB9E-6971-DC42-A1BC-800BDC376809}" type="datetime1">
               <a:rPr lang="en-US" smtClean="0"/>
-              <a:t>10/27/22</a:t>
+              <a:t>5/29/23</a:t>
             </a:fld>
             <a:endParaRPr lang="en-US"/>
           </a:p>
@@ -5961,7 +5961,7 @@
           <a:p>
             <a:r>
               <a:rPr lang="en-US"/>
-              <a:t>© 2022, FLL Tutorials</a:t>
+              <a:t>© 2023, FLLTutorials.com. Last Update 5/29/2023</a:t>
             </a:r>
           </a:p>
         </p:txBody>
@@ -6168,9 +6168,9 @@
           <a:bodyPr/>
           <a:lstStyle/>
           <a:p>
-            <a:fld id="{BB5472F9-ED27-5E4F-9F8D-B10DD7F533C9}" type="datetime1">
+            <a:fld id="{AB3EBD8A-8C83-924C-8083-B0828F671B5F}" type="datetime1">
               <a:rPr lang="en-US" smtClean="0"/>
-              <a:t>10/27/22</a:t>
+              <a:t>5/29/23</a:t>
             </a:fld>
             <a:endParaRPr lang="en-US"/>
           </a:p>
@@ -6193,7 +6193,7 @@
           <a:p>
             <a:r>
               <a:rPr lang="en-US"/>
-              <a:t>© 2022, FLL Tutorials</a:t>
+              <a:t>© 2023, FLLTutorials.com. Last Update 5/29/2023</a:t>
             </a:r>
           </a:p>
         </p:txBody>
@@ -6535,9 +6535,9 @@
           <a:bodyPr/>
           <a:lstStyle/>
           <a:p>
-            <a:fld id="{CF552A0D-C8D7-B940-AF1D-09FD14974A2A}" type="datetime1">
+            <a:fld id="{5C7D2A11-592A-0D46-B963-B00F8166823A}" type="datetime1">
               <a:rPr lang="en-US" smtClean="0"/>
-              <a:t>10/27/22</a:t>
+              <a:t>5/29/23</a:t>
             </a:fld>
             <a:endParaRPr lang="en-US"/>
           </a:p>
@@ -6560,7 +6560,7 @@
           <a:p>
             <a:r>
               <a:rPr lang="en-US"/>
-              <a:t>© 2022, FLL Tutorials</a:t>
+              <a:t>© 2023, FLLTutorials.com. Last Update 5/29/2023</a:t>
             </a:r>
           </a:p>
         </p:txBody>
@@ -6655,9 +6655,9 @@
           <a:bodyPr/>
           <a:lstStyle/>
           <a:p>
-            <a:fld id="{1F556232-257F-E641-BD8F-35AB5B234FE5}" type="datetime1">
+            <a:fld id="{4B20AFF1-B7C1-1840-B82C-3CFF58912DEC}" type="datetime1">
               <a:rPr lang="en-US" smtClean="0"/>
-              <a:t>10/27/22</a:t>
+              <a:t>5/29/23</a:t>
             </a:fld>
             <a:endParaRPr lang="en-US"/>
           </a:p>
@@ -6680,7 +6680,7 @@
           <a:p>
             <a:r>
               <a:rPr lang="en-US"/>
-              <a:t>© 2022, FLL Tutorials</a:t>
+              <a:t>© 2023, FLLTutorials.com. Last Update 5/29/2023</a:t>
             </a:r>
           </a:p>
         </p:txBody>
@@ -6753,9 +6753,9 @@
           <a:bodyPr/>
           <a:lstStyle/>
           <a:p>
-            <a:fld id="{69D83906-597A-134D-9D1E-23DD9336D925}" type="datetime1">
+            <a:fld id="{263DE6F4-199E-A84C-909B-37ED3941B6B4}" type="datetime1">
               <a:rPr lang="en-US" smtClean="0"/>
-              <a:t>10/27/22</a:t>
+              <a:t>5/29/23</a:t>
             </a:fld>
             <a:endParaRPr lang="en-US"/>
           </a:p>
@@ -6778,7 +6778,7 @@
           <a:p>
             <a:r>
               <a:rPr lang="en-US"/>
-              <a:t>© 2022, FLL Tutorials</a:t>
+              <a:t>© 2023, FLLTutorials.com. Last Update 5/29/2023</a:t>
             </a:r>
           </a:p>
         </p:txBody>
@@ -7010,9 +7010,9 @@
           <a:bodyPr/>
           <a:lstStyle/>
           <a:p>
-            <a:fld id="{136AB714-8092-A345-A15E-542846752313}" type="datetime1">
+            <a:fld id="{AF6ACA8B-D183-F442-B79A-518B840065FE}" type="datetime1">
               <a:rPr lang="en-US" smtClean="0"/>
-              <a:t>10/27/22</a:t>
+              <a:t>5/29/23</a:t>
             </a:fld>
             <a:endParaRPr lang="en-US"/>
           </a:p>
@@ -7058,7 +7058,7 @@
           <a:p>
             <a:r>
               <a:rPr lang="en-US"/>
-              <a:t>© 2022, FLL Tutorials</a:t>
+              <a:t>© 2023, FLLTutorials.com. Last Update 5/29/2023</a:t>
             </a:r>
           </a:p>
         </p:txBody>
@@ -7288,9 +7288,9 @@
           <a:bodyPr/>
           <a:lstStyle/>
           <a:p>
-            <a:fld id="{4D3B22B7-21B5-AD47-925F-87624FE1C8E4}" type="datetime1">
+            <a:fld id="{E1FC62F7-B66D-A44F-BA83-EF8672BDFD58}" type="datetime1">
               <a:rPr lang="en-US" smtClean="0"/>
-              <a:t>10/27/22</a:t>
+              <a:t>5/29/23</a:t>
             </a:fld>
             <a:endParaRPr lang="en-US"/>
           </a:p>
@@ -7313,7 +7313,7 @@
           <a:p>
             <a:r>
               <a:rPr lang="en-US"/>
-              <a:t>© 2022, FLL Tutorials</a:t>
+              <a:t>© 2023, FLLTutorials.com. Last Update 5/29/2023</a:t>
             </a:r>
           </a:p>
         </p:txBody>
@@ -7546,9 +7546,9 @@
           <a:bodyPr/>
           <a:lstStyle/>
           <a:p>
-            <a:fld id="{9E3EE6DE-25C4-994C-BB59-DD4B6023DAC2}" type="datetime1">
+            <a:fld id="{59F04713-FE05-144D-952B-4A6456A979FC}" type="datetime1">
               <a:rPr lang="en-US" smtClean="0"/>
-              <a:t>10/27/22</a:t>
+              <a:t>5/29/23</a:t>
             </a:fld>
             <a:endParaRPr lang="en-US"/>
           </a:p>
@@ -7571,7 +7571,7 @@
           <a:p>
             <a:r>
               <a:rPr lang="en-US"/>
-              <a:t>© 2022, FLL Tutorials</a:t>
+              <a:t>© 2023, FLLTutorials.com. Last Update 5/29/2023</a:t>
             </a:r>
           </a:p>
         </p:txBody>
@@ -7717,9 +7717,9 @@
           <a:bodyPr/>
           <a:lstStyle/>
           <a:p>
-            <a:fld id="{9CC9B5C8-4E05-CC4E-ADFF-30B578AB96FA}" type="datetime1">
+            <a:fld id="{331F42A1-FD22-9947-9610-A76AE48E5816}" type="datetime1">
               <a:rPr lang="en-US" smtClean="0"/>
-              <a:t>10/27/22</a:t>
+              <a:t>5/29/23</a:t>
             </a:fld>
             <a:endParaRPr lang="en-US"/>
           </a:p>
@@ -7742,7 +7742,7 @@
           <a:p>
             <a:r>
               <a:rPr lang="en-US"/>
-              <a:t>© 2022, FLL Tutorials</a:t>
+              <a:t>© 2023, FLLTutorials.com. Last Update 5/29/2023</a:t>
             </a:r>
           </a:p>
         </p:txBody>
@@ -7898,9 +7898,9 @@
           <a:bodyPr/>
           <a:lstStyle/>
           <a:p>
-            <a:fld id="{84E62F34-DF17-B346-9430-2E0BF6B2E930}" type="datetime1">
+            <a:fld id="{D1FD6273-06C1-2C40-84C2-4FE8B492E045}" type="datetime1">
               <a:rPr lang="en-US" smtClean="0"/>
-              <a:t>10/27/22</a:t>
+              <a:t>5/29/23</a:t>
             </a:fld>
             <a:endParaRPr lang="en-US"/>
           </a:p>
@@ -7923,7 +7923,7 @@
           <a:p>
             <a:r>
               <a:rPr lang="en-US"/>
-              <a:t>© 2022, FLL Tutorials</a:t>
+              <a:t>© 2023, FLLTutorials.com. Last Update 5/29/2023</a:t>
             </a:r>
           </a:p>
         </p:txBody>
@@ -8155,9 +8155,9 @@
           <a:bodyPr/>
           <a:lstStyle/>
           <a:p>
-            <a:fld id="{39A4DD55-346F-5249-BAA5-FD2ADEB4A35B}" type="datetime1">
+            <a:fld id="{6955C419-CB15-8C40-9774-0D34055F58BD}" type="datetime1">
               <a:rPr lang="en-US" smtClean="0"/>
-              <a:t>10/27/22</a:t>
+              <a:t>5/29/23</a:t>
             </a:fld>
             <a:endParaRPr lang="en-US"/>
           </a:p>
@@ -8180,7 +8180,7 @@
           <a:p>
             <a:r>
               <a:rPr lang="en-US"/>
-              <a:t>© 2022, FLL Tutorials</a:t>
+              <a:t>© 2023, FLLTutorials.com. Last Update 5/29/2023</a:t>
             </a:r>
           </a:p>
         </p:txBody>
@@ -9179,9 +9179,9 @@
           <a:bodyPr/>
           <a:lstStyle/>
           <a:p>
-            <a:fld id="{3C08AB74-6FAA-804F-B1F2-CFD784D0EE92}" type="datetime1">
+            <a:fld id="{622F5485-ED5B-5142-8E9A-18BD9EF2189F}" type="datetime1">
               <a:rPr lang="en-US" smtClean="0"/>
-              <a:t>10/27/22</a:t>
+              <a:t>5/29/23</a:t>
             </a:fld>
             <a:endParaRPr lang="en-US"/>
           </a:p>
@@ -9204,7 +9204,7 @@
           <a:p>
             <a:r>
               <a:rPr lang="en-US"/>
-              <a:t>© 2022, FLL Tutorials</a:t>
+              <a:t>© 2023, FLLTutorials.com. Last Update 5/29/2023</a:t>
             </a:r>
           </a:p>
         </p:txBody>
@@ -9441,9 +9441,9 @@
           <a:bodyPr/>
           <a:lstStyle/>
           <a:p>
-            <a:fld id="{DB11065C-378B-3040-9708-EA1688BE1B1E}" type="datetime1">
+            <a:fld id="{DBED04C4-E819-5344-A53D-2CA42F402A63}" type="datetime1">
               <a:rPr lang="en-US" smtClean="0"/>
-              <a:t>10/27/22</a:t>
+              <a:t>5/29/23</a:t>
             </a:fld>
             <a:endParaRPr lang="en-US"/>
           </a:p>
@@ -9489,7 +9489,7 @@
           <a:p>
             <a:r>
               <a:rPr lang="en-US"/>
-              <a:t>© 2022, FLL Tutorials</a:t>
+              <a:t>© 2023, FLLTutorials.com. Last Update 5/29/2023</a:t>
             </a:r>
           </a:p>
         </p:txBody>
@@ -9736,9 +9736,9 @@
           <a:bodyPr/>
           <a:lstStyle/>
           <a:p>
-            <a:fld id="{873CB1D1-A749-7248-B528-6FD36B7A936C}" type="datetime1">
+            <a:fld id="{410E1BEE-8F8A-0444-B072-B970B40A9E89}" type="datetime1">
               <a:rPr lang="en-US" smtClean="0"/>
-              <a:t>10/27/22</a:t>
+              <a:t>5/29/23</a:t>
             </a:fld>
             <a:endParaRPr lang="en-US"/>
           </a:p>
@@ -9761,7 +9761,7 @@
           <a:p>
             <a:r>
               <a:rPr lang="en-US"/>
-              <a:t>© 2022, FLL Tutorials</a:t>
+              <a:t>© 2023, FLLTutorials.com. Last Update 5/29/2023</a:t>
             </a:r>
           </a:p>
         </p:txBody>
@@ -10182,9 +10182,9 @@
           <a:bodyPr/>
           <a:lstStyle/>
           <a:p>
-            <a:fld id="{313C633E-FD99-424B-86DC-0D9BA27F07E3}" type="datetime1">
+            <a:fld id="{93B7E9D4-0B5C-CF43-B938-D634F7664E07}" type="datetime1">
               <a:rPr lang="en-US" smtClean="0"/>
-              <a:t>10/27/22</a:t>
+              <a:t>5/29/23</a:t>
             </a:fld>
             <a:endParaRPr lang="en-US"/>
           </a:p>
@@ -10207,7 +10207,7 @@
           <a:p>
             <a:r>
               <a:rPr lang="en-US"/>
-              <a:t>© 2022, FLL Tutorials</a:t>
+              <a:t>© 2023, FLLTutorials.com. Last Update 5/29/2023</a:t>
             </a:r>
           </a:p>
         </p:txBody>
@@ -10302,9 +10302,9 @@
           <a:bodyPr/>
           <a:lstStyle/>
           <a:p>
-            <a:fld id="{70C916D4-3BCC-8044-AD89-E18729C17CEB}" type="datetime1">
+            <a:fld id="{7E88D571-0AD6-D94E-A794-4BDCFB1DCA55}" type="datetime1">
               <a:rPr lang="en-US" smtClean="0"/>
-              <a:t>10/27/22</a:t>
+              <a:t>5/29/23</a:t>
             </a:fld>
             <a:endParaRPr lang="en-US"/>
           </a:p>
@@ -10327,7 +10327,7 @@
           <a:p>
             <a:r>
               <a:rPr lang="en-US"/>
-              <a:t>© 2022, FLL Tutorials</a:t>
+              <a:t>© 2023, FLLTutorials.com. Last Update 5/29/2023</a:t>
             </a:r>
           </a:p>
         </p:txBody>
@@ -10596,9 +10596,9 @@
           <a:bodyPr/>
           <a:lstStyle/>
           <a:p>
-            <a:fld id="{DC471B57-B5EF-0142-9A29-28E04057A0F1}" type="datetime1">
+            <a:fld id="{D101DAFC-E80A-1841-892A-5FAA13A2A3F0}" type="datetime1">
               <a:rPr lang="en-US" smtClean="0"/>
-              <a:t>10/27/22</a:t>
+              <a:t>5/29/23</a:t>
             </a:fld>
             <a:endParaRPr lang="en-US"/>
           </a:p>
@@ -10621,7 +10621,7 @@
           <a:p>
             <a:r>
               <a:rPr lang="en-US"/>
-              <a:t>© 2022, FLL Tutorials</a:t>
+              <a:t>© 2023, FLLTutorials.com. Last Update 5/29/2023</a:t>
             </a:r>
           </a:p>
         </p:txBody>
@@ -10694,9 +10694,9 @@
           <a:bodyPr/>
           <a:lstStyle/>
           <a:p>
-            <a:fld id="{C0520DCB-8CB5-784F-8ED4-A9FB33877599}" type="datetime1">
+            <a:fld id="{80BBEB7C-6EFD-3940-B5BE-65DB919F6F6C}" type="datetime1">
               <a:rPr lang="en-US" smtClean="0"/>
-              <a:t>10/27/22</a:t>
+              <a:t>5/29/23</a:t>
             </a:fld>
             <a:endParaRPr lang="en-US"/>
           </a:p>
@@ -10719,7 +10719,7 @@
           <a:p>
             <a:r>
               <a:rPr lang="en-US"/>
-              <a:t>© 2022, FLL Tutorials</a:t>
+              <a:t>© 2023, FLLTutorials.com. Last Update 5/29/2023</a:t>
             </a:r>
           </a:p>
         </p:txBody>
@@ -10944,9 +10944,9 @@
           <a:bodyPr/>
           <a:lstStyle/>
           <a:p>
-            <a:fld id="{A0BB16D4-A738-904C-8040-8071B1C54272}" type="datetime1">
+            <a:fld id="{A0848508-6E84-6C49-B41D-FA2E5406B97F}" type="datetime1">
               <a:rPr lang="en-US" smtClean="0"/>
-              <a:t>10/27/22</a:t>
+              <a:t>5/29/23</a:t>
             </a:fld>
             <a:endParaRPr lang="en-US"/>
           </a:p>
@@ -10969,7 +10969,7 @@
           <a:p>
             <a:r>
               <a:rPr lang="en-US"/>
-              <a:t>© 2022, FLL Tutorials</a:t>
+              <a:t>© 2023, FLLTutorials.com. Last Update 5/29/2023</a:t>
             </a:r>
           </a:p>
         </p:txBody>
@@ -11244,9 +11244,9 @@
           <a:bodyPr/>
           <a:lstStyle/>
           <a:p>
-            <a:fld id="{EB347C00-AEF0-1C45-82E4-53F437933502}" type="datetime1">
+            <a:fld id="{3EB8427E-0FA2-5F4B-909D-C18D067CABE4}" type="datetime1">
               <a:rPr lang="en-US" smtClean="0"/>
-              <a:t>10/27/22</a:t>
+              <a:t>5/29/23</a:t>
             </a:fld>
             <a:endParaRPr lang="en-US"/>
           </a:p>
@@ -11269,7 +11269,7 @@
           <a:p>
             <a:r>
               <a:rPr lang="en-US"/>
-              <a:t>© 2022, FLL Tutorials</a:t>
+              <a:t>© 2023, FLLTutorials.com. Last Update 5/29/2023</a:t>
             </a:r>
           </a:p>
         </p:txBody>
@@ -11503,9 +11503,9 @@
           <a:bodyPr/>
           <a:lstStyle/>
           <a:p>
-            <a:fld id="{0568E0A8-087A-0E42-A41C-4979532EDF87}" type="datetime1">
+            <a:fld id="{6AF58D60-E485-B945-B916-2C8D1893A1BF}" type="datetime1">
               <a:rPr lang="en-US" smtClean="0"/>
-              <a:t>10/27/22</a:t>
+              <a:t>5/29/23</a:t>
             </a:fld>
             <a:endParaRPr lang="en-US"/>
           </a:p>
@@ -11528,7 +11528,7 @@
           <a:p>
             <a:r>
               <a:rPr lang="en-US"/>
-              <a:t>© 2022, FLL Tutorials</a:t>
+              <a:t>© 2023, FLLTutorials.com. Last Update 5/29/2023</a:t>
             </a:r>
           </a:p>
         </p:txBody>
@@ -11684,9 +11684,9 @@
           <a:bodyPr/>
           <a:lstStyle/>
           <a:p>
-            <a:fld id="{184E5C2A-0FE8-9C48-89DA-2550CC73C0F6}" type="datetime1">
+            <a:fld id="{5FA053CB-BDD5-0B4C-947D-91400666B82F}" type="datetime1">
               <a:rPr lang="en-US" smtClean="0"/>
-              <a:t>10/27/22</a:t>
+              <a:t>5/29/23</a:t>
             </a:fld>
             <a:endParaRPr lang="en-US"/>
           </a:p>
@@ -11709,7 +11709,7 @@
           <a:p>
             <a:r>
               <a:rPr lang="en-US"/>
-              <a:t>© 2022, FLL Tutorials</a:t>
+              <a:t>© 2023, FLLTutorials.com. Last Update 5/29/2023</a:t>
             </a:r>
           </a:p>
         </p:txBody>
@@ -11900,9 +11900,9 @@
           <a:bodyPr/>
           <a:lstStyle/>
           <a:p>
-            <a:fld id="{C35564FF-4424-EB41-A9CB-2E1929E16837}" type="datetime1">
+            <a:fld id="{763DD864-5BB0-9D45-94F7-B0105F46B1C8}" type="datetime1">
               <a:rPr lang="en-US" smtClean="0"/>
-              <a:t>10/27/22</a:t>
+              <a:t>5/29/23</a:t>
             </a:fld>
             <a:endParaRPr lang="en-US"/>
           </a:p>
@@ -11930,7 +11930,7 @@
           <a:p>
             <a:r>
               <a:rPr lang="en-US"/>
-              <a:t>© 2022, FLL Tutorials</a:t>
+              <a:t>© 2023, FLLTutorials.com. Last Update 5/29/2023</a:t>
             </a:r>
           </a:p>
         </p:txBody>
@@ -13156,9 +13156,9 @@
           <a:bodyPr/>
           <a:lstStyle/>
           <a:p>
-            <a:fld id="{CA4E33D5-143D-B547-B7E4-55EE6FF871F3}" type="datetime1">
+            <a:fld id="{67AFCE29-BC7E-6442-AFEB-9158A899910A}" type="datetime1">
               <a:rPr lang="en-US" smtClean="0"/>
-              <a:t>10/27/22</a:t>
+              <a:t>5/29/23</a:t>
             </a:fld>
             <a:endParaRPr lang="en-US"/>
           </a:p>
@@ -13181,7 +13181,7 @@
           <a:p>
             <a:r>
               <a:rPr lang="en-US"/>
-              <a:t>© 2022, FLL Tutorials</a:t>
+              <a:t>© 2023, FLLTutorials.com. Last Update 5/29/2023</a:t>
             </a:r>
           </a:p>
         </p:txBody>
@@ -13421,9 +13421,9 @@
           <a:bodyPr/>
           <a:lstStyle/>
           <a:p>
-            <a:fld id="{B02A74E8-A6BF-6B44-8E20-573285B85A5B}" type="datetime1">
+            <a:fld id="{946F9259-685A-7247-A3F2-7D1246388740}" type="datetime1">
               <a:rPr lang="en-US" smtClean="0"/>
-              <a:t>10/27/22</a:t>
+              <a:t>5/29/23</a:t>
             </a:fld>
             <a:endParaRPr lang="en-US"/>
           </a:p>
@@ -13477,7 +13477,7 @@
           <a:p>
             <a:r>
               <a:rPr lang="en-US"/>
-              <a:t>© 2022, FLL Tutorials</a:t>
+              <a:t>© 2023, FLLTutorials.com. Last Update 5/29/2023</a:t>
             </a:r>
           </a:p>
         </p:txBody>
@@ -13724,9 +13724,9 @@
           <a:bodyPr/>
           <a:lstStyle/>
           <a:p>
-            <a:fld id="{4DB5DF27-3A0E-554E-BC1B-0FC9805ABA2D}" type="datetime1">
+            <a:fld id="{73AC7856-630F-A944-B680-D50AB30930DA}" type="datetime1">
               <a:rPr lang="en-US" smtClean="0"/>
-              <a:t>10/27/22</a:t>
+              <a:t>5/29/23</a:t>
             </a:fld>
             <a:endParaRPr lang="en-US"/>
           </a:p>
@@ -13749,7 +13749,7 @@
           <a:p>
             <a:r>
               <a:rPr lang="en-US"/>
-              <a:t>© 2022, FLL Tutorials</a:t>
+              <a:t>© 2023, FLLTutorials.com. Last Update 5/29/2023</a:t>
             </a:r>
           </a:p>
         </p:txBody>
@@ -14178,9 +14178,9 @@
           <a:bodyPr/>
           <a:lstStyle/>
           <a:p>
-            <a:fld id="{A8E53F17-2404-2044-8830-FCBF30253D21}" type="datetime1">
+            <a:fld id="{DD5FCA57-46CC-6846-9C6B-97A002B6A9C0}" type="datetime1">
               <a:rPr lang="en-US" smtClean="0"/>
-              <a:t>10/27/22</a:t>
+              <a:t>5/29/23</a:t>
             </a:fld>
             <a:endParaRPr lang="en-US"/>
           </a:p>
@@ -14203,7 +14203,7 @@
           <a:p>
             <a:r>
               <a:rPr lang="en-US"/>
-              <a:t>© 2022, FLL Tutorials</a:t>
+              <a:t>© 2023, FLLTutorials.com. Last Update 5/29/2023</a:t>
             </a:r>
           </a:p>
         </p:txBody>
@@ -14632,9 +14632,9 @@
           <a:bodyPr/>
           <a:lstStyle/>
           <a:p>
-            <a:fld id="{DBBF898A-6E42-444F-BA20-0A8ED7345EA2}" type="datetime1">
+            <a:fld id="{4E10A54D-1B25-6A4B-A94D-65A02F340461}" type="datetime1">
               <a:rPr lang="en-US" smtClean="0"/>
-              <a:t>10/27/22</a:t>
+              <a:t>5/29/23</a:t>
             </a:fld>
             <a:endParaRPr lang="en-US"/>
           </a:p>
@@ -14657,7 +14657,7 @@
           <a:p>
             <a:r>
               <a:rPr lang="en-US"/>
-              <a:t>© 2022, FLL Tutorials</a:t>
+              <a:t>© 2023, FLLTutorials.com. Last Update 5/29/2023</a:t>
             </a:r>
           </a:p>
         </p:txBody>
@@ -14752,9 +14752,9 @@
           <a:bodyPr/>
           <a:lstStyle/>
           <a:p>
-            <a:fld id="{DE0AC21D-A841-4746-8EDE-79D1DFE81BA6}" type="datetime1">
+            <a:fld id="{34811BDF-92DF-D443-899C-3B808BD0F696}" type="datetime1">
               <a:rPr lang="en-US" smtClean="0"/>
-              <a:t>10/27/22</a:t>
+              <a:t>5/29/23</a:t>
             </a:fld>
             <a:endParaRPr lang="en-US"/>
           </a:p>
@@ -14777,7 +14777,7 @@
           <a:p>
             <a:r>
               <a:rPr lang="en-US"/>
-              <a:t>© 2022, FLL Tutorials</a:t>
+              <a:t>© 2023, FLLTutorials.com. Last Update 5/29/2023</a:t>
             </a:r>
           </a:p>
         </p:txBody>
@@ -14858,9 +14858,9 @@
           <a:bodyPr/>
           <a:lstStyle/>
           <a:p>
-            <a:fld id="{2F2D1132-1E32-CE46-AE60-60461C37B044}" type="datetime1">
+            <a:fld id="{008C5A3F-D32A-6447-9EEB-A4565BA160ED}" type="datetime1">
               <a:rPr lang="en-US" smtClean="0"/>
-              <a:t>10/27/22</a:t>
+              <a:t>5/29/23</a:t>
             </a:fld>
             <a:endParaRPr lang="en-US"/>
           </a:p>
@@ -14883,7 +14883,7 @@
           <a:p>
             <a:r>
               <a:rPr lang="en-US"/>
-              <a:t>© 2022, FLL Tutorials</a:t>
+              <a:t>© 2023, FLLTutorials.com. Last Update 5/29/2023</a:t>
             </a:r>
           </a:p>
         </p:txBody>
@@ -15116,9 +15116,9 @@
           <a:bodyPr/>
           <a:lstStyle/>
           <a:p>
-            <a:fld id="{07CF0617-B977-AE4E-888E-8E223B165FA5}" type="datetime1">
+            <a:fld id="{0D13F66C-3FA5-F944-A9C6-827BD04EC94E}" type="datetime1">
               <a:rPr lang="en-US" smtClean="0"/>
-              <a:t>10/27/22</a:t>
+              <a:t>5/29/23</a:t>
             </a:fld>
             <a:endParaRPr lang="en-US"/>
           </a:p>
@@ -15141,7 +15141,7 @@
           <a:p>
             <a:r>
               <a:rPr lang="en-US"/>
-              <a:t>© 2022, FLL Tutorials</a:t>
+              <a:t>© 2023, FLLTutorials.com. Last Update 5/29/2023</a:t>
             </a:r>
           </a:p>
         </p:txBody>
@@ -15424,9 +15424,9 @@
           <a:bodyPr/>
           <a:lstStyle/>
           <a:p>
-            <a:fld id="{BE19E870-991A-764D-98F6-BB14069931DD}" type="datetime1">
+            <a:fld id="{A8D0A20E-66B5-1747-9627-3ED50333C525}" type="datetime1">
               <a:rPr lang="en-US" smtClean="0"/>
-              <a:t>10/27/22</a:t>
+              <a:t>5/29/23</a:t>
             </a:fld>
             <a:endParaRPr lang="en-US"/>
           </a:p>
@@ -15449,7 +15449,7 @@
           <a:p>
             <a:r>
               <a:rPr lang="en-US"/>
-              <a:t>© 2022, FLL Tutorials</a:t>
+              <a:t>© 2023, FLLTutorials.com. Last Update 5/29/2023</a:t>
             </a:r>
           </a:p>
         </p:txBody>
@@ -15691,9 +15691,9 @@
           <a:bodyPr/>
           <a:lstStyle/>
           <a:p>
-            <a:fld id="{D640F1E5-11BE-794E-8E2B-3E3F74885D57}" type="datetime1">
+            <a:fld id="{0CFC405E-5F46-EF4A-AA33-F80979D00917}" type="datetime1">
               <a:rPr lang="en-US" smtClean="0"/>
-              <a:t>10/27/22</a:t>
+              <a:t>5/29/23</a:t>
             </a:fld>
             <a:endParaRPr lang="en-US"/>
           </a:p>
@@ -15716,7 +15716,7 @@
           <a:p>
             <a:r>
               <a:rPr lang="en-US"/>
-              <a:t>© 2022, FLL Tutorials</a:t>
+              <a:t>© 2023, FLLTutorials.com. Last Update 5/29/2023</a:t>
             </a:r>
           </a:p>
         </p:txBody>
@@ -15880,9 +15880,9 @@
           <a:bodyPr/>
           <a:lstStyle/>
           <a:p>
-            <a:fld id="{7ACEEB6D-DCF3-C040-9508-6C96B2E1CEAE}" type="datetime1">
+            <a:fld id="{D4A37336-991F-324D-9B32-F54F18DBCDDB}" type="datetime1">
               <a:rPr lang="en-US" smtClean="0"/>
-              <a:t>10/27/22</a:t>
+              <a:t>5/29/23</a:t>
             </a:fld>
             <a:endParaRPr lang="en-US"/>
           </a:p>
@@ -15905,7 +15905,7 @@
           <a:p>
             <a:r>
               <a:rPr lang="en-US"/>
-              <a:t>© 2022, FLL Tutorials</a:t>
+              <a:t>© 2023, FLLTutorials.com. Last Update 5/29/2023</a:t>
             </a:r>
           </a:p>
         </p:txBody>
@@ -16081,9 +16081,9 @@
           <a:bodyPr/>
           <a:lstStyle/>
           <a:p>
-            <a:fld id="{C660ADD3-A617-9F45-9165-BDF9C821B97C}" type="datetime1">
+            <a:fld id="{76647B9F-43A5-B443-A49B-B69C6F0C26E6}" type="datetime1">
               <a:rPr lang="en-US" smtClean="0"/>
-              <a:t>10/27/22</a:t>
+              <a:t>5/29/23</a:t>
             </a:fld>
             <a:endParaRPr lang="en-US"/>
           </a:p>
@@ -16106,7 +16106,7 @@
           <a:p>
             <a:r>
               <a:rPr lang="en-US"/>
-              <a:t>© 2022, FLL Tutorials</a:t>
+              <a:t>© 2023, FLLTutorials.com. Last Update 5/29/2023</a:t>
             </a:r>
           </a:p>
         </p:txBody>
@@ -16252,9 +16252,9 @@
           <a:bodyPr/>
           <a:lstStyle/>
           <a:p>
-            <a:fld id="{7308CA3A-B25B-964D-A820-34D38EF53E70}" type="datetime1">
+            <a:fld id="{40C306DA-1AE1-A14B-A26C-5E07750114A6}" type="datetime1">
               <a:rPr lang="en-US" smtClean="0"/>
-              <a:t>10/27/22</a:t>
+              <a:t>5/29/23</a:t>
             </a:fld>
             <a:endParaRPr lang="en-US"/>
           </a:p>
@@ -16277,7 +16277,7 @@
           <a:p>
             <a:r>
               <a:rPr lang="en-US"/>
-              <a:t>© 2022, FLL Tutorials</a:t>
+              <a:t>© 2023, FLLTutorials.com. Last Update 5/29/2023</a:t>
             </a:r>
           </a:p>
         </p:txBody>
@@ -16500,9 +16500,9 @@
           <a:bodyPr/>
           <a:lstStyle/>
           <a:p>
-            <a:fld id="{B9738C39-CAFC-1F42-94C5-0748A4FA264E}" type="datetime1">
+            <a:fld id="{F7D5DF60-FE4C-104A-9FE0-A51768166770}" type="datetime1">
               <a:rPr lang="en-US" smtClean="0"/>
-              <a:t>10/27/22</a:t>
+              <a:t>5/29/23</a:t>
             </a:fld>
             <a:endParaRPr lang="en-US"/>
           </a:p>
@@ -16525,7 +16525,7 @@
           <a:p>
             <a:r>
               <a:rPr lang="en-US"/>
-              <a:t>© 2022, FLL Tutorials</a:t>
+              <a:t>© 2023, FLLTutorials.com. Last Update 5/29/2023</a:t>
             </a:r>
           </a:p>
         </p:txBody>
@@ -16732,9 +16732,9 @@
           <a:bodyPr/>
           <a:lstStyle/>
           <a:p>
-            <a:fld id="{46B7E2E4-3B15-9C43-A9F0-2865E5E60CDC}" type="datetime1">
+            <a:fld id="{E6024867-0E4A-8248-935A-8BF7EDC9AC9B}" type="datetime1">
               <a:rPr lang="en-US" smtClean="0"/>
-              <a:t>10/27/22</a:t>
+              <a:t>5/29/23</a:t>
             </a:fld>
             <a:endParaRPr lang="en-US"/>
           </a:p>
@@ -16757,7 +16757,7 @@
           <a:p>
             <a:r>
               <a:rPr lang="en-US"/>
-              <a:t>© 2022, FLL Tutorials</a:t>
+              <a:t>© 2023, FLLTutorials.com. Last Update 5/29/2023</a:t>
             </a:r>
           </a:p>
         </p:txBody>
@@ -16852,9 +16852,9 @@
           <a:bodyPr/>
           <a:lstStyle/>
           <a:p>
-            <a:fld id="{917F68EA-8534-0C4E-AC96-C7682CA07F00}" type="datetime1">
+            <a:fld id="{AE8BEDBA-7347-5E49-A670-8F527461BA3A}" type="datetime1">
               <a:rPr lang="en-US" smtClean="0"/>
-              <a:t>10/27/22</a:t>
+              <a:t>5/29/23</a:t>
             </a:fld>
             <a:endParaRPr lang="en-US"/>
           </a:p>
@@ -16877,7 +16877,7 @@
           <a:p>
             <a:r>
               <a:rPr lang="en-US"/>
-              <a:t>© 2022, FLL Tutorials</a:t>
+              <a:t>© 2023, FLLTutorials.com. Last Update 5/29/2023</a:t>
             </a:r>
           </a:p>
         </p:txBody>
@@ -17219,9 +17219,9 @@
           <a:bodyPr/>
           <a:lstStyle/>
           <a:p>
-            <a:fld id="{D473477C-1B61-1142-BC98-A5EA399E97B6}" type="datetime1">
+            <a:fld id="{C65E110E-6A1C-094B-AC2B-1814DEBB71D4}" type="datetime1">
               <a:rPr lang="en-US" smtClean="0"/>
-              <a:t>10/27/22</a:t>
+              <a:t>5/29/23</a:t>
             </a:fld>
             <a:endParaRPr lang="en-US"/>
           </a:p>
@@ -17244,7 +17244,7 @@
           <a:p>
             <a:r>
               <a:rPr lang="en-US"/>
-              <a:t>© 2022, FLL Tutorials</a:t>
+              <a:t>© 2023, FLLTutorials.com. Last Update 5/29/2023</a:t>
             </a:r>
           </a:p>
         </p:txBody>
@@ -17339,9 +17339,9 @@
           <a:bodyPr/>
           <a:lstStyle/>
           <a:p>
-            <a:fld id="{F86E0ABE-DE57-5B48-8870-72AE88054BEA}" type="datetime1">
+            <a:fld id="{C8BB33E4-5CA1-FF47-A28A-317CD312D262}" type="datetime1">
               <a:rPr lang="en-US" smtClean="0"/>
-              <a:t>10/27/22</a:t>
+              <a:t>5/29/23</a:t>
             </a:fld>
             <a:endParaRPr lang="en-US"/>
           </a:p>
@@ -17364,7 +17364,7 @@
           <a:p>
             <a:r>
               <a:rPr lang="en-US"/>
-              <a:t>© 2022, FLL Tutorials</a:t>
+              <a:t>© 2023, FLLTutorials.com. Last Update 5/29/2023</a:t>
             </a:r>
           </a:p>
         </p:txBody>
@@ -17437,9 +17437,9 @@
           <a:bodyPr/>
           <a:lstStyle/>
           <a:p>
-            <a:fld id="{3371EFB1-8175-2244-8A82-7AD53422E102}" type="datetime1">
+            <a:fld id="{F9E359A4-FEB2-2443-BC17-E38AA7AC6C6C}" type="datetime1">
               <a:rPr lang="en-US" smtClean="0"/>
-              <a:t>10/27/22</a:t>
+              <a:t>5/29/23</a:t>
             </a:fld>
             <a:endParaRPr lang="en-US"/>
           </a:p>
@@ -17462,7 +17462,7 @@
           <a:p>
             <a:r>
               <a:rPr lang="en-US"/>
-              <a:t>© 2022, FLL Tutorials</a:t>
+              <a:t>© 2023, FLLTutorials.com. Last Update 5/29/2023</a:t>
             </a:r>
           </a:p>
         </p:txBody>
@@ -17715,9 +17715,9 @@
           <a:bodyPr/>
           <a:lstStyle/>
           <a:p>
-            <a:fld id="{EF02199D-D53B-8341-9CFD-CE1764434E4B}" type="datetime1">
+            <a:fld id="{E1364A21-CDC5-7A42-B5AA-B2092E5CD66E}" type="datetime1">
               <a:rPr lang="en-US" smtClean="0"/>
-              <a:t>10/27/22</a:t>
+              <a:t>5/29/23</a:t>
             </a:fld>
             <a:endParaRPr lang="en-US"/>
           </a:p>
@@ -17740,7 +17740,7 @@
           <a:p>
             <a:r>
               <a:rPr lang="en-US"/>
-              <a:t>© 2022, FLL Tutorials</a:t>
+              <a:t>© 2023, FLLTutorials.com. Last Update 5/29/2023</a:t>
             </a:r>
           </a:p>
         </p:txBody>
@@ -17973,9 +17973,9 @@
           <a:bodyPr/>
           <a:lstStyle/>
           <a:p>
-            <a:fld id="{2433A9B1-4CE5-B74B-87AB-D6476015DE19}" type="datetime1">
+            <a:fld id="{1DB918B9-5E6C-8745-8D5A-510A737163F9}" type="datetime1">
               <a:rPr lang="en-US" smtClean="0"/>
-              <a:t>10/27/22</a:t>
+              <a:t>5/29/23</a:t>
             </a:fld>
             <a:endParaRPr lang="en-US"/>
           </a:p>
@@ -17998,7 +17998,7 @@
           <a:p>
             <a:r>
               <a:rPr lang="en-US"/>
-              <a:t>© 2022, FLL Tutorials</a:t>
+              <a:t>© 2023, FLLTutorials.com. Last Update 5/29/2023</a:t>
             </a:r>
           </a:p>
         </p:txBody>
@@ -18144,9 +18144,9 @@
           <a:bodyPr/>
           <a:lstStyle/>
           <a:p>
-            <a:fld id="{90687265-C7E5-0844-9162-5EAEB212165A}" type="datetime1">
+            <a:fld id="{C5567D20-2F02-C24B-ABEE-4557CCA35336}" type="datetime1">
               <a:rPr lang="en-US" smtClean="0"/>
-              <a:t>10/27/22</a:t>
+              <a:t>5/29/23</a:t>
             </a:fld>
             <a:endParaRPr lang="en-US"/>
           </a:p>
@@ -18169,7 +18169,7 @@
           <a:p>
             <a:r>
               <a:rPr lang="en-US"/>
-              <a:t>© 2022, FLL Tutorials</a:t>
+              <a:t>© 2023, FLLTutorials.com. Last Update 5/29/2023</a:t>
             </a:r>
           </a:p>
         </p:txBody>
@@ -18325,9 +18325,9 @@
           <a:bodyPr/>
           <a:lstStyle/>
           <a:p>
-            <a:fld id="{CE861652-A948-E94B-BC22-24DDAD60F96B}" type="datetime1">
+            <a:fld id="{AA150FA7-979E-BB48-AC2F-511FAA4F0D3A}" type="datetime1">
               <a:rPr lang="en-US" smtClean="0"/>
-              <a:t>10/27/22</a:t>
+              <a:t>5/29/23</a:t>
             </a:fld>
             <a:endParaRPr lang="en-US"/>
           </a:p>
@@ -18350,7 +18350,7 @@
           <a:p>
             <a:r>
               <a:rPr lang="en-US"/>
-              <a:t>© 2022, FLL Tutorials</a:t>
+              <a:t>© 2023, FLLTutorials.com. Last Update 5/29/2023</a:t>
             </a:r>
           </a:p>
         </p:txBody>
@@ -18642,9 +18642,9 @@
             </a:lvl1pPr>
           </a:lstStyle>
           <a:p>
-            <a:fld id="{B0F03FD7-A836-634E-8AF3-31349885E714}" type="datetime1">
+            <a:fld id="{AACB1174-23B5-7F4D-BBFC-31D09F8EE2C8}" type="datetime1">
               <a:rPr lang="en-US" smtClean="0"/>
-              <a:t>10/27/22</a:t>
+              <a:t>5/29/23</a:t>
             </a:fld>
             <a:endParaRPr lang="en-US"/>
           </a:p>
@@ -18686,7 +18686,7 @@
           <a:p>
             <a:r>
               <a:rPr lang="en-US"/>
-              <a:t>© 2022, FLL Tutorials</a:t>
+              <a:t>© 2023, FLLTutorials.com. Last Update 5/29/2023</a:t>
             </a:r>
           </a:p>
         </p:txBody>
@@ -18975,9 +18975,9 @@
             </a:lvl1pPr>
           </a:lstStyle>
           <a:p>
-            <a:fld id="{80C4B75C-99C7-0644-9EAF-7424B61438DD}" type="datetime1">
+            <a:fld id="{467DC5F1-2538-5047-AE53-B3F91219C966}" type="datetime1">
               <a:rPr lang="en-US" smtClean="0"/>
-              <a:t>10/27/22</a:t>
+              <a:t>5/29/23</a:t>
             </a:fld>
             <a:endParaRPr lang="en-US"/>
           </a:p>
@@ -19022,7 +19022,7 @@
           <a:p>
             <a:r>
               <a:rPr lang="en-US"/>
-              <a:t>© 2022, FLL Tutorials</a:t>
+              <a:t>© 2023, FLLTutorials.com. Last Update 5/29/2023</a:t>
             </a:r>
           </a:p>
         </p:txBody>
@@ -19429,7 +19429,7 @@
             <a:fld id="{B61BEF0D-F0BB-DE4B-95CE-6DB70DBA9567}" type="datetimeFigureOut">
               <a:rPr lang="en-US" smtClean="0"/>
               <a:pPr/>
-              <a:t>10/27/22</a:t>
+              <a:t>5/29/23</a:t>
             </a:fld>
             <a:endParaRPr lang="en-US" dirty="0"/>
           </a:p>
@@ -19745,9 +19745,9 @@
           <a:bodyPr/>
           <a:lstStyle/>
           <a:p>
-            <a:fld id="{7358BEE6-189F-5442-8DD6-9D572F077E2C}" type="datetime1">
+            <a:fld id="{2ECC8FDC-5937-EB47-9B66-9DF620D508A8}" type="datetime1">
               <a:rPr lang="en-US" smtClean="0"/>
-              <a:t>10/27/22</a:t>
+              <a:t>5/29/23</a:t>
             </a:fld>
             <a:endParaRPr lang="en-US"/>
           </a:p>
@@ -19770,7 +19770,7 @@
           <a:p>
             <a:r>
               <a:rPr lang="en-US"/>
-              <a:t>© 2022, FLL Tutorials</a:t>
+              <a:t>© 2023, FLLTutorials.com. Last Update 5/29/2023</a:t>
             </a:r>
           </a:p>
         </p:txBody>
@@ -20031,9 +20031,9 @@
           <a:bodyPr/>
           <a:lstStyle/>
           <a:p>
-            <a:fld id="{0055A132-875E-C849-AE59-CAAEC94E8010}" type="datetime1">
+            <a:fld id="{E1BFEC28-2DA8-C647-B7C8-C3ED469F2641}" type="datetime1">
               <a:rPr lang="en-US" smtClean="0"/>
-              <a:t>10/27/22</a:t>
+              <a:t>5/29/23</a:t>
             </a:fld>
             <a:endParaRPr lang="en-US"/>
           </a:p>
@@ -20064,7 +20064,7 @@
           <a:p>
             <a:r>
               <a:rPr lang="en-US"/>
-              <a:t>© 2022, FLL Tutorials</a:t>
+              <a:t>© 2023, FLLTutorials.com. Last Update 5/29/2023</a:t>
             </a:r>
           </a:p>
         </p:txBody>
@@ -20479,9 +20479,9 @@
           <a:bodyPr/>
           <a:lstStyle/>
           <a:p>
-            <a:fld id="{48020AE9-4546-4C43-B58A-8E542928871C}" type="datetime1">
+            <a:fld id="{2419838C-5A88-B443-A793-6153A0A8EBEA}" type="datetime1">
               <a:rPr lang="en-US" smtClean="0"/>
-              <a:t>10/27/22</a:t>
+              <a:t>5/29/23</a:t>
             </a:fld>
             <a:endParaRPr lang="en-US"/>
           </a:p>
@@ -20512,7 +20512,7 @@
           <a:p>
             <a:r>
               <a:rPr lang="en-US"/>
-              <a:t>© 2022, FLL Tutorials</a:t>
+              <a:t>© 2023, FLLTutorials.com. Last Update 5/29/2023</a:t>
             </a:r>
           </a:p>
         </p:txBody>
@@ -20663,9 +20663,9 @@
           <a:bodyPr/>
           <a:lstStyle/>
           <a:p>
-            <a:fld id="{8B4735FE-2C46-8D4A-A529-BCB3E27DEF42}" type="datetime1">
+            <a:fld id="{DF9AD57C-65EE-4F4C-84D4-665D294D129B}" type="datetime1">
               <a:rPr lang="en-US" smtClean="0"/>
-              <a:t>10/27/22</a:t>
+              <a:t>5/29/23</a:t>
             </a:fld>
             <a:endParaRPr lang="en-US"/>
           </a:p>
@@ -20696,7 +20696,7 @@
           <a:p>
             <a:r>
               <a:rPr lang="en-US"/>
-              <a:t>© 2022, FLL Tutorials</a:t>
+              <a:t>© 2023, FLLTutorials.com. Last Update 5/29/2023</a:t>
             </a:r>
           </a:p>
         </p:txBody>
@@ -20785,9 +20785,9 @@
           <a:bodyPr/>
           <a:lstStyle/>
           <a:p>
-            <a:fld id="{C31D7DD2-B280-9B48-BE79-1740E154BF11}" type="datetime1">
+            <a:fld id="{C484E400-7384-0347-BEF4-9D6A8E6EF528}" type="datetime1">
               <a:rPr lang="en-US" smtClean="0"/>
-              <a:t>10/27/22</a:t>
+              <a:t>5/29/23</a:t>
             </a:fld>
             <a:endParaRPr lang="en-US"/>
           </a:p>
@@ -20818,7 +20818,7 @@
           <a:p>
             <a:r>
               <a:rPr lang="en-US"/>
-              <a:t>© 2022, FLL Tutorials</a:t>
+              <a:t>© 2023, FLLTutorials.com. Last Update 5/29/2023</a:t>
             </a:r>
           </a:p>
         </p:txBody>
@@ -21190,9 +21190,9 @@
             </a:lvl1pPr>
           </a:lstStyle>
           <a:p>
-            <a:fld id="{802E495B-9E02-4F46-B98E-A14153BAA5CA}" type="datetime1">
+            <a:fld id="{53DCF30D-E8F2-0D47-8318-F61AA3BFD0B3}" type="datetime1">
               <a:rPr lang="en-US" smtClean="0"/>
-              <a:t>10/27/22</a:t>
+              <a:t>5/29/23</a:t>
             </a:fld>
             <a:endParaRPr lang="en-US"/>
           </a:p>
@@ -21234,7 +21234,7 @@
           <a:p>
             <a:r>
               <a:rPr lang="en-US"/>
-              <a:t>© 2022, FLL Tutorials</a:t>
+              <a:t>© 2023, FLLTutorials.com. Last Update 5/29/2023</a:t>
             </a:r>
           </a:p>
         </p:txBody>
@@ -21506,9 +21506,9 @@
           <a:bodyPr/>
           <a:lstStyle/>
           <a:p>
-            <a:fld id="{DB5788ED-181F-D545-B5ED-AC9C8ACFC027}" type="datetime1">
+            <a:fld id="{CAAA9BB4-77F9-0549-A07D-8BD7660CFDE7}" type="datetime1">
               <a:rPr lang="en-US" smtClean="0"/>
-              <a:t>10/27/22</a:t>
+              <a:t>5/29/23</a:t>
             </a:fld>
             <a:endParaRPr lang="en-US"/>
           </a:p>
@@ -21539,7 +21539,7 @@
           <a:p>
             <a:r>
               <a:rPr lang="en-US"/>
-              <a:t>© 2022, FLL Tutorials</a:t>
+              <a:t>© 2023, FLLTutorials.com. Last Update 5/29/2023</a:t>
             </a:r>
           </a:p>
         </p:txBody>
@@ -21758,9 +21758,9 @@
           <a:bodyPr/>
           <a:lstStyle/>
           <a:p>
-            <a:fld id="{16DDEE07-B1E9-164F-8CB1-9BA9880045BD}" type="datetime1">
+            <a:fld id="{A32D37F7-ADF5-884A-9680-C7E2AF36E813}" type="datetime1">
               <a:rPr lang="en-US" smtClean="0"/>
-              <a:t>10/27/22</a:t>
+              <a:t>5/29/23</a:t>
             </a:fld>
             <a:endParaRPr lang="en-US"/>
           </a:p>
@@ -21791,7 +21791,7 @@
           <a:p>
             <a:r>
               <a:rPr lang="en-US"/>
-              <a:t>© 2022, FLL Tutorials</a:t>
+              <a:t>© 2023, FLLTutorials.com. Last Update 5/29/2023</a:t>
             </a:r>
           </a:p>
         </p:txBody>
@@ -22015,9 +22015,9 @@
             </a:lvl1pPr>
           </a:lstStyle>
           <a:p>
-            <a:fld id="{559282B3-C5DA-AD4E-B716-6EF73BA17580}" type="datetime1">
+            <a:fld id="{5FAEF632-2EA8-194A-87B6-AD0B6E5E546A}" type="datetime1">
               <a:rPr lang="en-US" smtClean="0"/>
-              <a:t>10/27/22</a:t>
+              <a:t>5/29/23</a:t>
             </a:fld>
             <a:endParaRPr lang="en-US"/>
           </a:p>
@@ -22048,7 +22048,7 @@
           <a:p>
             <a:r>
               <a:rPr lang="en-US"/>
-              <a:t>© 2022, FLL Tutorials</a:t>
+              <a:t>© 2023, FLLTutorials.com. Last Update 5/29/2023</a:t>
             </a:r>
           </a:p>
         </p:txBody>
@@ -22292,9 +22292,9 @@
           <a:bodyPr/>
           <a:lstStyle/>
           <a:p>
-            <a:fld id="{38013532-D8A4-4E48-95A1-1F3DDB6095D6}" type="datetime1">
+            <a:fld id="{160D46A8-3178-9E49-909A-62CB86C19F2E}" type="datetime1">
               <a:rPr lang="en-US" smtClean="0"/>
-              <a:t>10/27/22</a:t>
+              <a:t>5/29/23</a:t>
             </a:fld>
             <a:endParaRPr lang="en-US"/>
           </a:p>
@@ -22317,7 +22317,7 @@
           <a:p>
             <a:r>
               <a:rPr lang="en-US"/>
-              <a:t>© 2022, FLL Tutorials</a:t>
+              <a:t>© 2023, FLLTutorials.com. Last Update 5/29/2023</a:t>
             </a:r>
           </a:p>
         </p:txBody>
@@ -22592,9 +22592,9 @@
           <a:bodyPr/>
           <a:lstStyle/>
           <a:p>
-            <a:fld id="{C1160299-1129-8A41-A14F-8E2D19F36995}" type="datetime1">
+            <a:fld id="{2BC3F12C-90A0-C44A-B74A-658CB6C4BD5C}" type="datetime1">
               <a:rPr lang="en-US" smtClean="0"/>
-              <a:t>10/27/22</a:t>
+              <a:t>5/29/23</a:t>
             </a:fld>
             <a:endParaRPr lang="en-US"/>
           </a:p>
@@ -22617,7 +22617,7 @@
           <a:p>
             <a:r>
               <a:rPr lang="en-US"/>
-              <a:t>© 2022, FLL Tutorials</a:t>
+              <a:t>© 2023, FLLTutorials.com. Last Update 5/29/2023</a:t>
             </a:r>
           </a:p>
         </p:txBody>
@@ -22893,9 +22893,9 @@
             </a:lvl1pPr>
           </a:lstStyle>
           <a:p>
-            <a:fld id="{D3FC5CA6-D466-554F-8265-25D9C95C370E}" type="datetime1">
+            <a:fld id="{6565CC0C-2939-5840-9267-C17F072C12E0}" type="datetime1">
               <a:rPr lang="en-US" smtClean="0"/>
-              <a:t>10/27/22</a:t>
+              <a:t>5/29/23</a:t>
             </a:fld>
             <a:endParaRPr lang="en-US"/>
           </a:p>
@@ -22934,7 +22934,7 @@
           <a:p>
             <a:r>
               <a:rPr lang="en-US"/>
-              <a:t>© 2022, FLL Tutorials</a:t>
+              <a:t>© 2023, FLLTutorials.com. Last Update 5/29/2023</a:t>
             </a:r>
           </a:p>
         </p:txBody>
@@ -23845,9 +23845,9 @@
             </a:lvl1pPr>
           </a:lstStyle>
           <a:p>
-            <a:fld id="{908113E3-0626-A34F-98E1-35A606F422E4}" type="datetime1">
+            <a:fld id="{B245233B-8EE2-6D4A-B665-41FB62629D4A}" type="datetime1">
               <a:rPr lang="en-US" smtClean="0"/>
-              <a:t>10/27/22</a:t>
+              <a:t>5/29/23</a:t>
             </a:fld>
             <a:endParaRPr lang="en-US"/>
           </a:p>
@@ -23886,7 +23886,7 @@
           <a:p>
             <a:r>
               <a:rPr lang="en-US"/>
-              <a:t>© 2022, FLL Tutorials</a:t>
+              <a:t>© 2023, FLLTutorials.com. Last Update 5/29/2023</a:t>
             </a:r>
           </a:p>
         </p:txBody>
@@ -24903,9 +24903,9 @@
             </a:lvl1pPr>
           </a:lstStyle>
           <a:p>
-            <a:fld id="{351C7A01-A13C-2B49-AEB1-CD88F3FB7E60}" type="datetime1">
+            <a:fld id="{01CB751D-9DE6-D442-B69C-4097A1CA2490}" type="datetime1">
               <a:rPr lang="en-US" smtClean="0"/>
-              <a:t>10/27/22</a:t>
+              <a:t>5/29/23</a:t>
             </a:fld>
             <a:endParaRPr lang="en-US"/>
           </a:p>
@@ -24946,7 +24946,7 @@
           <a:p>
             <a:r>
               <a:rPr lang="en-US"/>
-              <a:t>© 2022, FLL Tutorials</a:t>
+              <a:t>© 2023, FLLTutorials.com. Last Update 5/29/2023</a:t>
             </a:r>
           </a:p>
         </p:txBody>
@@ -25445,9 +25445,9 @@
             </a:lvl1pPr>
           </a:lstStyle>
           <a:p>
-            <a:fld id="{1B59A823-B995-0A4D-99B4-B6A4D43EDAFB}" type="datetime1">
+            <a:fld id="{19ECFF5F-FE51-504F-A124-E0CE48B72B81}" type="datetime1">
               <a:rPr lang="en-US" smtClean="0"/>
-              <a:t>10/27/22</a:t>
+              <a:t>5/29/23</a:t>
             </a:fld>
             <a:endParaRPr lang="en-US"/>
           </a:p>
@@ -25486,7 +25486,7 @@
           <a:p>
             <a:r>
               <a:rPr lang="en-US"/>
-              <a:t>© 2022, FLL Tutorials</a:t>
+              <a:t>© 2023, FLLTutorials.com. Last Update 5/29/2023</a:t>
             </a:r>
           </a:p>
         </p:txBody>
@@ -26814,9 +26814,9 @@
             </a:lvl1pPr>
           </a:lstStyle>
           <a:p>
-            <a:fld id="{E6F5FDB6-97A3-404C-8AC8-84CCAD706601}" type="datetime1">
+            <a:fld id="{A0565A33-7F1D-9249-BBA9-FF39CC501192}" type="datetime1">
               <a:rPr lang="en-US" smtClean="0"/>
-              <a:t>10/27/22</a:t>
+              <a:t>5/29/23</a:t>
             </a:fld>
             <a:endParaRPr lang="en-US"/>
           </a:p>
@@ -26855,7 +26855,7 @@
           <a:p>
             <a:r>
               <a:rPr lang="en-US"/>
-              <a:t>© 2022, FLL Tutorials</a:t>
+              <a:t>© 2023, FLLTutorials.com. Last Update 5/29/2023</a:t>
             </a:r>
           </a:p>
         </p:txBody>
@@ -27892,9 +27892,9 @@
             </a:lvl1pPr>
           </a:lstStyle>
           <a:p>
-            <a:fld id="{DEF8475C-64AC-014F-BECE-ABB32E32B65D}" type="datetime1">
+            <a:fld id="{4A00586C-EBC7-D846-8122-48BCD34FA9BF}" type="datetime1">
               <a:rPr lang="en-US" smtClean="0"/>
-              <a:t>10/27/22</a:t>
+              <a:t>5/29/23</a:t>
             </a:fld>
             <a:endParaRPr lang="en-US"/>
           </a:p>
@@ -27935,7 +27935,7 @@
           <a:p>
             <a:r>
               <a:rPr lang="en-US"/>
-              <a:t>© 2022, FLL Tutorials</a:t>
+              <a:t>© 2023, FLLTutorials.com. Last Update 5/29/2023</a:t>
             </a:r>
           </a:p>
         </p:txBody>
@@ -28554,9 +28554,9 @@
             </a:lvl1pPr>
           </a:lstStyle>
           <a:p>
-            <a:fld id="{299E908B-A439-374C-A7E9-06FB7544B6FE}" type="datetime1">
+            <a:fld id="{75B90968-A7D7-3349-8898-4714D09AEB1E}" type="datetime1">
               <a:rPr lang="en-US" smtClean="0"/>
-              <a:t>10/27/22</a:t>
+              <a:t>5/29/23</a:t>
             </a:fld>
             <a:endParaRPr lang="en-US"/>
           </a:p>
@@ -28604,7 +28604,7 @@
           <a:p>
             <a:r>
               <a:rPr lang="en-US"/>
-              <a:t>© 2022, FLL Tutorials</a:t>
+              <a:t>© 2023, FLLTutorials.com. Last Update 5/29/2023</a:t>
             </a:r>
           </a:p>
         </p:txBody>
@@ -29095,13 +29095,8 @@
             </a:br>
             <a:r>
               <a:rPr lang="en-US" dirty="0"/>
-              <a:t>aligning in </a:t>
-            </a:r>
-            <a:r>
-              <a:rPr lang="en-US" dirty="0" err="1"/>
-              <a:t>bAse</a:t>
-            </a:r>
-            <a:endParaRPr lang="en-US" dirty="0"/>
+              <a:t>aligning in LAUNCH AREA</a:t>
+            </a:r>
           </a:p>
         </p:txBody>
       </p:sp>
@@ -29157,12 +29152,221 @@
           <a:chExt cx="0" cy="0"/>
         </a:xfrm>
       </p:grpSpPr>
+      <p:sp>
+        <p:nvSpPr>
+          <p:cNvPr id="2" name="Title 1"/>
+          <p:cNvSpPr>
+            <a:spLocks noGrp="1"/>
+          </p:cNvSpPr>
+          <p:nvPr>
+            <p:ph type="title"/>
+          </p:nvPr>
+        </p:nvSpPr>
+        <p:spPr/>
+        <p:txBody>
+          <a:bodyPr/>
+          <a:lstStyle/>
+          <a:p>
+            <a:r>
+              <a:rPr lang="en-US" dirty="0"/>
+              <a:t>USING MARKINGS IN THE LAUNCH AREA</a:t>
+            </a:r>
+          </a:p>
+        </p:txBody>
+      </p:sp>
+      <p:sp>
+        <p:nvSpPr>
+          <p:cNvPr id="3" name="Content Placeholder 2"/>
+          <p:cNvSpPr>
+            <a:spLocks noGrp="1"/>
+          </p:cNvSpPr>
+          <p:nvPr>
+            <p:ph idx="1"/>
+          </p:nvPr>
+        </p:nvSpPr>
+        <p:spPr>
+          <a:xfrm>
+            <a:off x="457200" y="1524318"/>
+            <a:ext cx="4114800" cy="4373563"/>
+          </a:xfrm>
+        </p:spPr>
+        <p:txBody>
+          <a:bodyPr>
+            <a:normAutofit/>
+          </a:bodyPr>
+          <a:lstStyle/>
+          <a:p>
+            <a:r>
+              <a:rPr lang="en-US" sz="2000" dirty="0"/>
+              <a:t>Aligning before you launch helps your robot get a good start</a:t>
+            </a:r>
+          </a:p>
+          <a:p>
+            <a:r>
+              <a:rPr lang="en-US" sz="2000" dirty="0"/>
+              <a:t>Notice that the Launch Area has markings like a grid. Use these marks to start you robot in the same spot each time</a:t>
+            </a:r>
+          </a:p>
+          <a:p>
+            <a:r>
+              <a:rPr lang="en-US" sz="2000" dirty="0"/>
+              <a:t>You can also use the text or logos in Launch Area to align your robot (</a:t>
+            </a:r>
+            <a:r>
+              <a:rPr lang="en-US" sz="2000" dirty="0" err="1"/>
+              <a:t>eg.</a:t>
+            </a:r>
+            <a:r>
+              <a:rPr lang="en-US" sz="2000" dirty="0"/>
+              <a:t> Start at the top of the red box surrounding the word </a:t>
+            </a:r>
+            <a:r>
+              <a:rPr lang="en-US" sz="2000" i="1" dirty="0"/>
+              <a:t>Challenge</a:t>
+            </a:r>
+            <a:r>
+              <a:rPr lang="en-US" sz="2000" dirty="0"/>
+              <a:t>)</a:t>
+            </a:r>
+          </a:p>
+          <a:p>
+            <a:pPr marL="342900" indent="-342900">
+              <a:buFont typeface="Arial" charset="0"/>
+              <a:buChar char="•"/>
+            </a:pPr>
+            <a:endParaRPr lang="en-US" sz="1600" dirty="0"/>
+          </a:p>
+        </p:txBody>
+      </p:sp>
+      <p:sp>
+        <p:nvSpPr>
+          <p:cNvPr id="4" name="Footer Placeholder 3"/>
+          <p:cNvSpPr>
+            <a:spLocks noGrp="1"/>
+          </p:cNvSpPr>
+          <p:nvPr>
+            <p:ph type="ftr" sz="quarter" idx="11"/>
+          </p:nvPr>
+        </p:nvSpPr>
+        <p:spPr/>
+        <p:txBody>
+          <a:bodyPr/>
+          <a:lstStyle/>
+          <a:p>
+            <a:r>
+              <a:rPr lang="en-US"/>
+              <a:t>© 2023, FLLTutorials.com. Last Update 5/29/2023</a:t>
+            </a:r>
+            <a:endParaRPr lang="en-US" dirty="0"/>
+          </a:p>
+        </p:txBody>
+      </p:sp>
       <p:pic>
         <p:nvPicPr>
-          <p:cNvPr id="9" name="Picture 8" descr="A picture containing map&#10;&#10;Description automatically generated">
+          <p:cNvPr id="5" name="Picture 4" descr="A picture containing map&#10;&#10;Description automatically generated">
             <a:extLst>
               <a:ext uri="{FF2B5EF4-FFF2-40B4-BE49-F238E27FC236}">
-                <a16:creationId xmlns:a16="http://schemas.microsoft.com/office/drawing/2014/main" id="{0B42FF39-8ACE-70D2-32B1-790DB3737237}"/>
+                <a16:creationId xmlns:a16="http://schemas.microsoft.com/office/drawing/2014/main" id="{6CBBDE93-A3C6-1BFC-9F1E-B79233510452}"/>
+              </a:ext>
+            </a:extLst>
+          </p:cNvPr>
+          <p:cNvPicPr>
+            <a:picLocks noChangeAspect="1"/>
+          </p:cNvPicPr>
+          <p:nvPr/>
+        </p:nvPicPr>
+        <p:blipFill rotWithShape="1">
+          <a:blip r:embed="rId2">
+            <a:extLst>
+              <a:ext uri="{28A0092B-C50C-407E-A947-70E740481C1C}">
+                <a14:useLocalDpi xmlns:a14="http://schemas.microsoft.com/office/drawing/2010/main" val="0"/>
+              </a:ext>
+            </a:extLst>
+          </a:blip>
+          <a:srcRect l="6862" t="55640" r="71289"/>
+          <a:stretch/>
+        </p:blipFill>
+        <p:spPr>
+          <a:xfrm>
+            <a:off x="4572000" y="1599811"/>
+            <a:ext cx="3800473" cy="3733871"/>
+          </a:xfrm>
+          <a:prstGeom prst="rect">
+            <a:avLst/>
+          </a:prstGeom>
+        </p:spPr>
+      </p:pic>
+      <p:sp>
+        <p:nvSpPr>
+          <p:cNvPr id="16" name="TextBox 15">
+            <a:extLst>
+              <a:ext uri="{FF2B5EF4-FFF2-40B4-BE49-F238E27FC236}">
+                <a16:creationId xmlns:a16="http://schemas.microsoft.com/office/drawing/2014/main" id="{12BEFE51-3BDC-539D-57EA-2BA884F38648}"/>
+              </a:ext>
+            </a:extLst>
+          </p:cNvPr>
+          <p:cNvSpPr txBox="1"/>
+          <p:nvPr/>
+        </p:nvSpPr>
+        <p:spPr>
+          <a:xfrm>
+            <a:off x="4572000" y="5333682"/>
+            <a:ext cx="3915817" cy="369332"/>
+          </a:xfrm>
+          <a:prstGeom prst="rect">
+            <a:avLst/>
+          </a:prstGeom>
+          <a:noFill/>
+        </p:spPr>
+        <p:txBody>
+          <a:bodyPr wrap="square" rtlCol="0">
+            <a:spAutoFit/>
+          </a:bodyPr>
+          <a:lstStyle/>
+          <a:p>
+            <a:r>
+              <a:rPr lang="en-US" dirty="0"/>
+              <a:t>Sample mat from past season</a:t>
+            </a:r>
+          </a:p>
+        </p:txBody>
+      </p:sp>
+    </p:spTree>
+    <p:extLst>
+      <p:ext uri="{BB962C8B-B14F-4D97-AF65-F5344CB8AC3E}">
+        <p14:creationId xmlns:p14="http://schemas.microsoft.com/office/powerpoint/2010/main" val="1779812628"/>
+      </p:ext>
+    </p:extLst>
+  </p:cSld>
+  <p:clrMapOvr>
+    <a:masterClrMapping/>
+  </p:clrMapOvr>
+</p:sld>
+</file>
+
+<file path=ppt/slides/slide3.xml><?xml version="1.0" encoding="utf-8"?>
+<p:sld xmlns:a="http://schemas.openxmlformats.org/drawingml/2006/main" xmlns:r="http://schemas.openxmlformats.org/officeDocument/2006/relationships" xmlns:p="http://schemas.openxmlformats.org/presentationml/2006/main">
+  <p:cSld>
+    <p:spTree>
+      <p:nvGrpSpPr>
+        <p:cNvPr id="1" name=""/>
+        <p:cNvGrpSpPr/>
+        <p:nvPr/>
+      </p:nvGrpSpPr>
+      <p:grpSpPr>
+        <a:xfrm>
+          <a:off x="0" y="0"/>
+          <a:ext cx="0" cy="0"/>
+          <a:chOff x="0" y="0"/>
+          <a:chExt cx="0" cy="0"/>
+        </a:xfrm>
+      </p:grpSpPr>
+      <p:pic>
+        <p:nvPicPr>
+          <p:cNvPr id="6" name="Picture 5" descr="A close up of a board&#10;&#10;Description automatically generated with low confidence">
+            <a:extLst>
+              <a:ext uri="{FF2B5EF4-FFF2-40B4-BE49-F238E27FC236}">
+                <a16:creationId xmlns:a16="http://schemas.microsoft.com/office/drawing/2014/main" id="{26CBE70A-D10E-838A-C465-AFDD3ADBB5D1}"/>
               </a:ext>
             </a:extLst>
           </p:cNvPr>
@@ -29185,8 +29389,8 @@
         </p:blipFill>
         <p:spPr>
           <a:xfrm>
-            <a:off x="867902" y="2668489"/>
-            <a:ext cx="7772400" cy="3761051"/>
+            <a:off x="457200" y="2615369"/>
+            <a:ext cx="8156858" cy="3772547"/>
           </a:xfrm>
           <a:prstGeom prst="rect">
             <a:avLst/>
@@ -29210,7 +29414,7 @@
           <a:p>
             <a:r>
               <a:rPr lang="en-US" dirty="0"/>
-              <a:t>WHY Align in base</a:t>
+              <a:t>OTHER GOOD PRACTICES FOR ALIGNMENT</a:t>
             </a:r>
           </a:p>
         </p:txBody>
@@ -29243,16 +29447,6 @@
             </a:pPr>
             <a:r>
               <a:rPr lang="en-US" sz="2000" dirty="0"/>
-              <a:t>Aligning in base helps your robot get a good start</a:t>
-            </a:r>
-          </a:p>
-          <a:p>
-            <a:pPr marL="342900" indent="-342900">
-              <a:buFont typeface="Arial" charset="0"/>
-              <a:buChar char="•"/>
-            </a:pPr>
-            <a:r>
-              <a:rPr lang="en-US" sz="2000" dirty="0"/>
               <a:t>When you begin your run, consider </a:t>
             </a:r>
             <a:r>
@@ -29273,7 +29467,7 @@
             </a:r>
             <a:r>
               <a:rPr lang="en-US" sz="2000" dirty="0"/>
-              <a:t>to straighten out before you head out of Launch</a:t>
+              <a:t>to straighten out before you head out of the Launch Area</a:t>
             </a:r>
             <a:endParaRPr lang="en-US" sz="1600" dirty="0"/>
           </a:p>
@@ -29303,7 +29497,7 @@
           <a:p>
             <a:r>
               <a:rPr lang="en-US"/>
-              <a:t>© 2022, FLL Tutorials</a:t>
+              <a:t>© 2023, FLLTutorials.com. Last Update 5/29/2023</a:t>
             </a:r>
             <a:endParaRPr lang="en-US" dirty="0"/>
           </a:p>
@@ -29571,361 +29765,7 @@
     </p:spTree>
     <p:extLst>
       <p:ext uri="{BB962C8B-B14F-4D97-AF65-F5344CB8AC3E}">
-        <p14:creationId xmlns:p14="http://schemas.microsoft.com/office/powerpoint/2010/main" val="1779812628"/>
-      </p:ext>
-    </p:extLst>
-  </p:cSld>
-  <p:clrMapOvr>
-    <a:masterClrMapping/>
-  </p:clrMapOvr>
-</p:sld>
-</file>
-
-<file path=ppt/slides/slide3.xml><?xml version="1.0" encoding="utf-8"?>
-<p:sld xmlns:a="http://schemas.openxmlformats.org/drawingml/2006/main" xmlns:r="http://schemas.openxmlformats.org/officeDocument/2006/relationships" xmlns:p="http://schemas.openxmlformats.org/presentationml/2006/main">
-  <p:cSld>
-    <p:spTree>
-      <p:nvGrpSpPr>
-        <p:cNvPr id="1" name=""/>
-        <p:cNvGrpSpPr/>
-        <p:nvPr/>
-      </p:nvGrpSpPr>
-      <p:grpSpPr>
-        <a:xfrm>
-          <a:off x="0" y="0"/>
-          <a:ext cx="0" cy="0"/>
-          <a:chOff x="0" y="0"/>
-          <a:chExt cx="0" cy="0"/>
-        </a:xfrm>
-      </p:grpSpPr>
-      <p:pic>
-        <p:nvPicPr>
-          <p:cNvPr id="5" name="Picture 4" descr="A picture containing map&#10;&#10;Description automatically generated">
-            <a:extLst>
-              <a:ext uri="{FF2B5EF4-FFF2-40B4-BE49-F238E27FC236}">
-                <a16:creationId xmlns:a16="http://schemas.microsoft.com/office/drawing/2014/main" id="{ADC08C7F-1738-0390-7320-320CD9C6C6B3}"/>
-              </a:ext>
-            </a:extLst>
-          </p:cNvPr>
-          <p:cNvPicPr>
-            <a:picLocks noChangeAspect="1"/>
-          </p:cNvPicPr>
-          <p:nvPr/>
-        </p:nvPicPr>
-        <p:blipFill rotWithShape="1">
-          <a:blip r:embed="rId2">
-            <a:extLst>
-              <a:ext uri="{28A0092B-C50C-407E-A947-70E740481C1C}">
-                <a14:useLocalDpi xmlns:a14="http://schemas.microsoft.com/office/drawing/2010/main" val="0"/>
-              </a:ext>
-            </a:extLst>
-          </a:blip>
-          <a:srcRect l="6862" t="55640" r="71289"/>
-          <a:stretch/>
-        </p:blipFill>
-        <p:spPr>
-          <a:xfrm>
-            <a:off x="581192" y="1848256"/>
-            <a:ext cx="3800473" cy="3733871"/>
-          </a:xfrm>
-          <a:prstGeom prst="rect">
-            <a:avLst/>
-          </a:prstGeom>
-        </p:spPr>
-      </p:pic>
-      <p:sp>
-        <p:nvSpPr>
-          <p:cNvPr id="2" name="Title 1">
-            <a:extLst>
-              <a:ext uri="{FF2B5EF4-FFF2-40B4-BE49-F238E27FC236}">
-                <a16:creationId xmlns:a16="http://schemas.microsoft.com/office/drawing/2014/main" id="{481017F2-5333-424C-88FA-7692DB9A2082}"/>
-              </a:ext>
-            </a:extLst>
-          </p:cNvPr>
-          <p:cNvSpPr>
-            <a:spLocks noGrp="1"/>
-          </p:cNvSpPr>
-          <p:nvPr>
-            <p:ph type="title"/>
-          </p:nvPr>
-        </p:nvSpPr>
-        <p:spPr/>
-        <p:txBody>
-          <a:bodyPr/>
-          <a:lstStyle/>
-          <a:p>
-            <a:r>
-              <a:rPr lang="en-US" dirty="0"/>
-              <a:t>LINES AND MARKINGS IN BASE</a:t>
-            </a:r>
-          </a:p>
-        </p:txBody>
-      </p:sp>
-      <p:sp>
-        <p:nvSpPr>
-          <p:cNvPr id="3" name="Content Placeholder 2">
-            <a:extLst>
-              <a:ext uri="{FF2B5EF4-FFF2-40B4-BE49-F238E27FC236}">
-                <a16:creationId xmlns:a16="http://schemas.microsoft.com/office/drawing/2014/main" id="{E2D7DC27-DAA2-5245-8E31-70E07679A7B2}"/>
-              </a:ext>
-            </a:extLst>
-          </p:cNvPr>
-          <p:cNvSpPr>
-            <a:spLocks noGrp="1"/>
-          </p:cNvSpPr>
-          <p:nvPr>
-            <p:ph idx="1"/>
-          </p:nvPr>
-        </p:nvSpPr>
-        <p:spPr>
-          <a:xfrm>
-            <a:off x="4886325" y="1505583"/>
-            <a:ext cx="3800473" cy="4353215"/>
-          </a:xfrm>
-        </p:spPr>
-        <p:txBody>
-          <a:bodyPr>
-            <a:normAutofit fontScale="92500" lnSpcReduction="20000"/>
-          </a:bodyPr>
-          <a:lstStyle/>
-          <a:p>
-            <a:r>
-              <a:rPr lang="en-US" dirty="0"/>
-              <a:t>Notice that base has markings like a grid. Use these to align</a:t>
-            </a:r>
-          </a:p>
-          <a:p>
-            <a:r>
-              <a:rPr lang="en-US" dirty="0"/>
-              <a:t>You can also use the text in base to align your robot (</a:t>
-            </a:r>
-            <a:r>
-              <a:rPr lang="en-US" dirty="0" err="1"/>
-              <a:t>eg.</a:t>
-            </a:r>
-            <a:r>
-              <a:rPr lang="en-US" dirty="0"/>
-              <a:t> at the top of the word </a:t>
-            </a:r>
-            <a:r>
-              <a:rPr lang="en-US" i="1" dirty="0"/>
-              <a:t>Challenge</a:t>
-            </a:r>
-            <a:r>
-              <a:rPr lang="en-US" dirty="0"/>
-              <a:t>)</a:t>
-            </a:r>
-          </a:p>
-        </p:txBody>
-      </p:sp>
-      <p:sp>
-        <p:nvSpPr>
-          <p:cNvPr id="4" name="Footer Placeholder 3">
-            <a:extLst>
-              <a:ext uri="{FF2B5EF4-FFF2-40B4-BE49-F238E27FC236}">
-                <a16:creationId xmlns:a16="http://schemas.microsoft.com/office/drawing/2014/main" id="{32F80C96-7D55-E344-A9AC-AE5AD1A088EA}"/>
-              </a:ext>
-            </a:extLst>
-          </p:cNvPr>
-          <p:cNvSpPr>
-            <a:spLocks noGrp="1"/>
-          </p:cNvSpPr>
-          <p:nvPr>
-            <p:ph type="ftr" sz="quarter" idx="11"/>
-          </p:nvPr>
-        </p:nvSpPr>
-        <p:spPr>
-          <a:xfrm>
-            <a:off x="581192" y="6387916"/>
-            <a:ext cx="4870585" cy="365125"/>
-          </a:xfrm>
-        </p:spPr>
-        <p:txBody>
-          <a:bodyPr/>
-          <a:lstStyle/>
-          <a:p>
-            <a:r>
-              <a:rPr lang="en-US"/>
-              <a:t>© 2022, FLL Tutorials</a:t>
-            </a:r>
-          </a:p>
-        </p:txBody>
-      </p:sp>
-      <p:grpSp>
-        <p:nvGrpSpPr>
-          <p:cNvPr id="6" name="Group 5">
-            <a:extLst>
-              <a:ext uri="{FF2B5EF4-FFF2-40B4-BE49-F238E27FC236}">
-                <a16:creationId xmlns:a16="http://schemas.microsoft.com/office/drawing/2014/main" id="{A4E30454-443F-4F40-BEAE-0724E8F0E8DD}"/>
-              </a:ext>
-            </a:extLst>
-          </p:cNvPr>
-          <p:cNvGrpSpPr/>
-          <p:nvPr/>
-        </p:nvGrpSpPr>
-        <p:grpSpPr>
-          <a:xfrm>
-            <a:off x="2166213" y="4613422"/>
-            <a:ext cx="731520" cy="914400"/>
-            <a:chOff x="7091680" y="2316689"/>
-            <a:chExt cx="731520" cy="914400"/>
-          </a:xfrm>
-        </p:grpSpPr>
-        <p:sp>
-          <p:nvSpPr>
-            <p:cNvPr id="8" name="Rounded Rectangle 7">
-              <a:extLst>
-                <a:ext uri="{FF2B5EF4-FFF2-40B4-BE49-F238E27FC236}">
-                  <a16:creationId xmlns:a16="http://schemas.microsoft.com/office/drawing/2014/main" id="{6EB6304B-492F-2946-ACDE-12F9AF78DDC7}"/>
-                </a:ext>
-              </a:extLst>
-            </p:cNvPr>
-            <p:cNvSpPr/>
-            <p:nvPr/>
-          </p:nvSpPr>
-          <p:spPr>
-            <a:xfrm>
-              <a:off x="7132320" y="2316689"/>
-              <a:ext cx="650240" cy="914400"/>
-            </a:xfrm>
-            <a:prstGeom prst="roundRect">
-              <a:avLst/>
-            </a:prstGeom>
-            <a:solidFill>
-              <a:srgbClr val="FF0000"/>
-            </a:solidFill>
-            <a:ln>
-              <a:noFill/>
-            </a:ln>
-          </p:spPr>
-          <p:style>
-            <a:lnRef idx="2">
-              <a:schemeClr val="accent1">
-                <a:shade val="50000"/>
-              </a:schemeClr>
-            </a:lnRef>
-            <a:fillRef idx="1">
-              <a:schemeClr val="accent1"/>
-            </a:fillRef>
-            <a:effectRef idx="0">
-              <a:schemeClr val="accent1"/>
-            </a:effectRef>
-            <a:fontRef idx="minor">
-              <a:schemeClr val="lt1"/>
-            </a:fontRef>
-          </p:style>
-          <p:txBody>
-            <a:bodyPr rtlCol="0" anchor="ctr"/>
-            <a:lstStyle/>
-            <a:p>
-              <a:pPr algn="ctr"/>
-              <a:endParaRPr lang="en-US"/>
-            </a:p>
-          </p:txBody>
-        </p:sp>
-        <p:sp>
-          <p:nvSpPr>
-            <p:cNvPr id="9" name="Oval 8">
-              <a:extLst>
-                <a:ext uri="{FF2B5EF4-FFF2-40B4-BE49-F238E27FC236}">
-                  <a16:creationId xmlns:a16="http://schemas.microsoft.com/office/drawing/2014/main" id="{3F001677-014B-2F46-862D-FA5A90738D24}"/>
-                </a:ext>
-              </a:extLst>
-            </p:cNvPr>
-            <p:cNvSpPr/>
-            <p:nvPr/>
-          </p:nvSpPr>
-          <p:spPr>
-            <a:xfrm>
-              <a:off x="7091680" y="2834849"/>
-              <a:ext cx="111760" cy="304800"/>
-            </a:xfrm>
-            <a:prstGeom prst="ellipse">
-              <a:avLst/>
-            </a:prstGeom>
-            <a:ln>
-              <a:noFill/>
-            </a:ln>
-          </p:spPr>
-          <p:style>
-            <a:lnRef idx="2">
-              <a:schemeClr val="accent1">
-                <a:shade val="50000"/>
-              </a:schemeClr>
-            </a:lnRef>
-            <a:fillRef idx="1">
-              <a:schemeClr val="accent1"/>
-            </a:fillRef>
-            <a:effectRef idx="0">
-              <a:schemeClr val="accent1"/>
-            </a:effectRef>
-            <a:fontRef idx="minor">
-              <a:schemeClr val="lt1"/>
-            </a:fontRef>
-          </p:style>
-          <p:txBody>
-            <a:bodyPr rtlCol="0" anchor="ctr"/>
-            <a:lstStyle/>
-            <a:p>
-              <a:pPr algn="ctr"/>
-              <a:endParaRPr lang="en-US" dirty="0"/>
-            </a:p>
-          </p:txBody>
-        </p:sp>
-        <p:sp>
-          <p:nvSpPr>
-            <p:cNvPr id="10" name="Oval 9">
-              <a:extLst>
-                <a:ext uri="{FF2B5EF4-FFF2-40B4-BE49-F238E27FC236}">
-                  <a16:creationId xmlns:a16="http://schemas.microsoft.com/office/drawing/2014/main" id="{D077A3B7-9C97-B84B-A191-DB888E548E0A}"/>
-                </a:ext>
-              </a:extLst>
-            </p:cNvPr>
-            <p:cNvSpPr/>
-            <p:nvPr/>
-          </p:nvSpPr>
-          <p:spPr>
-            <a:xfrm>
-              <a:off x="7711440" y="2834849"/>
-              <a:ext cx="111760" cy="304800"/>
-            </a:xfrm>
-            <a:prstGeom prst="ellipse">
-              <a:avLst/>
-            </a:prstGeom>
-            <a:ln>
-              <a:noFill/>
-            </a:ln>
-          </p:spPr>
-          <p:style>
-            <a:lnRef idx="2">
-              <a:schemeClr val="accent1">
-                <a:shade val="50000"/>
-              </a:schemeClr>
-            </a:lnRef>
-            <a:fillRef idx="1">
-              <a:schemeClr val="accent1"/>
-            </a:fillRef>
-            <a:effectRef idx="0">
-              <a:schemeClr val="accent1"/>
-            </a:effectRef>
-            <a:fontRef idx="minor">
-              <a:schemeClr val="lt1"/>
-            </a:fontRef>
-          </p:style>
-          <p:txBody>
-            <a:bodyPr rtlCol="0" anchor="ctr"/>
-            <a:lstStyle/>
-            <a:p>
-              <a:pPr algn="ctr"/>
-              <a:endParaRPr lang="en-US"/>
-            </a:p>
-          </p:txBody>
-        </p:sp>
-      </p:grpSp>
-    </p:spTree>
-    <p:extLst>
-      <p:ext uri="{BB962C8B-B14F-4D97-AF65-F5344CB8AC3E}">
-        <p14:creationId xmlns:p14="http://schemas.microsoft.com/office/powerpoint/2010/main" val="780848644"/>
+        <p14:creationId xmlns:p14="http://schemas.microsoft.com/office/powerpoint/2010/main" val="2823484512"/>
       </p:ext>
     </p:extLst>
   </p:cSld>
@@ -29975,7 +29815,7 @@
           <a:p>
             <a:r>
               <a:rPr lang="en-US" dirty="0"/>
-              <a:t>JIGS</a:t>
+              <a:t>USING JIGS</a:t>
             </a:r>
           </a:p>
         </p:txBody>
@@ -29998,19 +29838,19 @@
         </p:nvSpPr>
         <p:spPr>
           <a:xfrm>
-            <a:off x="4400551" y="1505583"/>
-            <a:ext cx="4286248" cy="4353215"/>
+            <a:off x="4400551" y="1813389"/>
+            <a:ext cx="4286248" cy="4045409"/>
           </a:xfrm>
         </p:spPr>
         <p:txBody>
           <a:bodyPr>
-            <a:normAutofit fontScale="92500" lnSpcReduction="20000"/>
+            <a:normAutofit fontScale="55000" lnSpcReduction="20000"/>
           </a:bodyPr>
           <a:lstStyle/>
           <a:p>
             <a:r>
               <a:rPr lang="en-US" dirty="0"/>
-              <a:t>Jigs are LEGO guides/rulers that the team places in base</a:t>
+              <a:t>Jigs are LEGO guides/rulers that the team places in the Launch Area</a:t>
             </a:r>
           </a:p>
           <a:p>
@@ -30023,6 +29863,28 @@
             <a:r>
               <a:rPr lang="en-US" dirty="0"/>
               <a:t>Jigs can be made from any LEGO elements (including Duplo)</a:t>
+            </a:r>
+          </a:p>
+          <a:p>
+            <a:r>
+              <a:rPr lang="en-US" dirty="0"/>
+              <a:t>Read the rules carefully to check if a jig can extend outside </a:t>
+            </a:r>
+            <a:r>
+              <a:rPr lang="en-US"/>
+              <a:t>the Launch </a:t>
+            </a:r>
+            <a:r>
+              <a:rPr lang="en-US" dirty="0"/>
+              <a:t>A</a:t>
+            </a:r>
+            <a:r>
+              <a:rPr lang="en-US"/>
+              <a:t>rea </a:t>
+            </a:r>
+            <a:r>
+              <a:rPr lang="en-US" dirty="0"/>
+              <a:t>and if you are allowed to hold it in place or not (rules can vary every year)</a:t>
             </a:r>
           </a:p>
         </p:txBody>
@@ -30055,7 +29917,7 @@
           <a:p>
             <a:r>
               <a:rPr lang="en-US"/>
-              <a:t>© 2022, FLL Tutorials</a:t>
+              <a:t>© 2023, FLLTutorials.com. Last Update 5/29/2023</a:t>
             </a:r>
           </a:p>
         </p:txBody>
@@ -30291,7 +30153,7 @@
           <a:p>
             <a:r>
               <a:rPr lang="en-US"/>
-              <a:t>© 2022, FLL Tutorials</a:t>
+              <a:t>© 2023, FLLTutorials.com. Last Update 5/29/2023</a:t>
             </a:r>
           </a:p>
         </p:txBody>
@@ -30321,7 +30183,7 @@
           <a:effectLst/>
           <a:extLst>
             <a:ext uri="{91240B29-F687-4f45-9708-019B960494DF}">
-              <a14:hiddenLine xmlns="" xmlns:a14="http://schemas.microsoft.com/office/drawing/2010/main" w="9525">
+              <a14:hiddenLine xmlns:a14="http://schemas.microsoft.com/office/drawing/2010/main" xmlns="" w="9525">
                 <a:solidFill>
                   <a:schemeClr val="tx1"/>
                 </a:solidFill>
@@ -30331,7 +30193,7 @@
               </a14:hiddenLine>
             </a:ext>
             <a:ext uri="{AF507438-7753-43e0-B8FC-AC1667EBCBE1}">
-              <a14:hiddenEffects xmlns="" xmlns:a14="http://schemas.microsoft.com/office/drawing/2010/main">
+              <a14:hiddenEffects xmlns:a14="http://schemas.microsoft.com/office/drawing/2010/main" xmlns="">
                 <a:effectLst>
                   <a:outerShdw dist="35921" dir="2700000" algn="ctr" rotWithShape="0">
                     <a:schemeClr val="bg2"/>
@@ -30672,7 +30534,7 @@
           <a:noFill/>
           <a:extLst>
             <a:ext uri="{909E8E84-426E-40dd-AFC4-6F175D3DCCD1}">
-              <a14:hiddenFill xmlns="" xmlns:a14="http://schemas.microsoft.com/office/drawing/2010/main">
+              <a14:hiddenFill xmlns:a14="http://schemas.microsoft.com/office/drawing/2010/main" xmlns="">
                 <a:solidFill>
                   <a:srgbClr val="FFFFFF"/>
                 </a:solidFill>

</xml_diff>